<commit_message>
adding last version of poster
</commit_message>
<xml_diff>
--- a/AASposter.pptx
+++ b/AASposter.pptx
@@ -164,7 +164,7 @@
             </a:lvl1pPr>
           </a:lstStyle>
           <a:p>
-            <a:endParaRPr lang="en-US"/>
+            <a:endParaRPr lang="en-US" dirty="0"/>
           </a:p>
         </p:txBody>
       </p:sp>
@@ -197,9 +197,9 @@
           <a:p>
             <a:fld id="{CAA8088A-3997-4C4B-B4BE-69F98D1C95FD}" type="datetimeFigureOut">
               <a:rPr lang="en-US" smtClean="0"/>
-              <a:t>12/20/18</a:t>
+              <a:t>12/21/18</a:t>
             </a:fld>
-            <a:endParaRPr lang="en-US"/>
+            <a:endParaRPr lang="en-US" dirty="0"/>
           </a:p>
         </p:txBody>
       </p:sp>
@@ -232,7 +232,7 @@
           <a:bodyPr vert="horz" lIns="91440" tIns="45720" rIns="91440" bIns="45720" rtlCol="0" anchor="ctr"/>
           <a:lstStyle/>
           <a:p>
-            <a:endParaRPr lang="en-US"/>
+            <a:endParaRPr lang="en-US" dirty="0"/>
           </a:p>
         </p:txBody>
       </p:sp>
@@ -322,7 +322,7 @@
             </a:lvl1pPr>
           </a:lstStyle>
           <a:p>
-            <a:endParaRPr lang="en-US"/>
+            <a:endParaRPr lang="en-US" dirty="0"/>
           </a:p>
         </p:txBody>
       </p:sp>
@@ -357,7 +357,7 @@
               <a:rPr lang="en-US" smtClean="0"/>
               <a:t>‹#›</a:t>
             </a:fld>
-            <a:endParaRPr lang="en-US"/>
+            <a:endParaRPr lang="en-US" dirty="0"/>
           </a:p>
         </p:txBody>
       </p:sp>
@@ -536,7 +536,7 @@
               <a:rPr lang="en-US" smtClean="0"/>
               <a:t>1</a:t>
             </a:fld>
-            <a:endParaRPr lang="en-US"/>
+            <a:endParaRPr lang="en-US" dirty="0"/>
           </a:p>
         </p:txBody>
       </p:sp>
@@ -777,9 +777,9 @@
           <a:p>
             <a:fld id="{BEF3EF1F-4106-EF46-91A0-37C4FFBE3DFA}" type="datetimeFigureOut">
               <a:rPr lang="en-US" smtClean="0"/>
-              <a:t>12/20/18</a:t>
+              <a:t>12/21/18</a:t>
             </a:fld>
-            <a:endParaRPr lang="en-US"/>
+            <a:endParaRPr lang="en-US" dirty="0"/>
           </a:p>
         </p:txBody>
       </p:sp>
@@ -803,7 +803,7 @@
           <a:bodyPr/>
           <a:lstStyle/>
           <a:p>
-            <a:endParaRPr lang="en-US"/>
+            <a:endParaRPr lang="en-US" dirty="0"/>
           </a:p>
         </p:txBody>
       </p:sp>
@@ -831,7 +831,7 @@
               <a:rPr lang="en-US" smtClean="0"/>
               <a:t>‹#›</a:t>
             </a:fld>
-            <a:endParaRPr lang="en-US"/>
+            <a:endParaRPr lang="en-US" dirty="0"/>
           </a:p>
         </p:txBody>
       </p:sp>
@@ -990,10 +990,9 @@
               <a:buNone/>
             </a:pPr>
             <a:r>
-              <a:rPr lang="en-US"/>
+              <a:rPr lang="en-US" dirty="0"/>
               <a:t>Click icon to add picture</a:t>
             </a:r>
-            <a:endParaRPr lang="en-US" dirty="0"/>
           </a:p>
         </p:txBody>
       </p:sp>
@@ -1081,9 +1080,9 @@
           <a:p>
             <a:fld id="{BEF3EF1F-4106-EF46-91A0-37C4FFBE3DFA}" type="datetimeFigureOut">
               <a:rPr lang="en-US" smtClean="0"/>
-              <a:t>12/20/18</a:t>
+              <a:t>12/21/18</a:t>
             </a:fld>
-            <a:endParaRPr lang="en-US"/>
+            <a:endParaRPr lang="en-US" dirty="0"/>
           </a:p>
         </p:txBody>
       </p:sp>
@@ -1102,7 +1101,7 @@
           <a:bodyPr/>
           <a:lstStyle/>
           <a:p>
-            <a:endParaRPr lang="en-US"/>
+            <a:endParaRPr lang="en-US" dirty="0"/>
           </a:p>
         </p:txBody>
       </p:sp>
@@ -1125,7 +1124,7 @@
               <a:rPr lang="en-US" smtClean="0"/>
               <a:t>‹#›</a:t>
             </a:fld>
-            <a:endParaRPr lang="en-US"/>
+            <a:endParaRPr lang="en-US" dirty="0"/>
           </a:p>
         </p:txBody>
       </p:sp>
@@ -1359,9 +1358,9 @@
           <a:p>
             <a:fld id="{BEF3EF1F-4106-EF46-91A0-37C4FFBE3DFA}" type="datetimeFigureOut">
               <a:rPr lang="en-US" smtClean="0"/>
-              <a:t>12/20/18</a:t>
+              <a:t>12/21/18</a:t>
             </a:fld>
-            <a:endParaRPr lang="en-US"/>
+            <a:endParaRPr lang="en-US" dirty="0"/>
           </a:p>
         </p:txBody>
       </p:sp>
@@ -1380,7 +1379,7 @@
           <a:bodyPr/>
           <a:lstStyle/>
           <a:p>
-            <a:endParaRPr lang="en-US"/>
+            <a:endParaRPr lang="en-US" dirty="0"/>
           </a:p>
         </p:txBody>
       </p:sp>
@@ -1403,7 +1402,7 @@
               <a:rPr lang="en-US" smtClean="0"/>
               <a:t>‹#›</a:t>
             </a:fld>
-            <a:endParaRPr lang="en-US"/>
+            <a:endParaRPr lang="en-US" dirty="0"/>
           </a:p>
         </p:txBody>
       </p:sp>
@@ -1929,9 +1928,9 @@
           <a:p>
             <a:fld id="{BEF3EF1F-4106-EF46-91A0-37C4FFBE3DFA}" type="datetimeFigureOut">
               <a:rPr lang="en-US" smtClean="0"/>
-              <a:t>12/20/18</a:t>
+              <a:t>12/21/18</a:t>
             </a:fld>
-            <a:endParaRPr lang="en-US"/>
+            <a:endParaRPr lang="en-US" dirty="0"/>
           </a:p>
         </p:txBody>
       </p:sp>
@@ -1950,7 +1949,7 @@
           <a:bodyPr/>
           <a:lstStyle/>
           <a:p>
-            <a:endParaRPr lang="en-US"/>
+            <a:endParaRPr lang="en-US" dirty="0"/>
           </a:p>
         </p:txBody>
       </p:sp>
@@ -1973,7 +1972,7 @@
               <a:rPr lang="en-US" smtClean="0"/>
               <a:t>‹#›</a:t>
             </a:fld>
-            <a:endParaRPr lang="en-US"/>
+            <a:endParaRPr lang="en-US" dirty="0"/>
           </a:p>
         </p:txBody>
       </p:sp>
@@ -2207,9 +2206,9 @@
           <a:p>
             <a:fld id="{BEF3EF1F-4106-EF46-91A0-37C4FFBE3DFA}" type="datetimeFigureOut">
               <a:rPr lang="en-US" smtClean="0"/>
-              <a:t>12/20/18</a:t>
+              <a:t>12/21/18</a:t>
             </a:fld>
-            <a:endParaRPr lang="en-US"/>
+            <a:endParaRPr lang="en-US" dirty="0"/>
           </a:p>
         </p:txBody>
       </p:sp>
@@ -2228,7 +2227,7 @@
           <a:bodyPr/>
           <a:lstStyle/>
           <a:p>
-            <a:endParaRPr lang="en-US"/>
+            <a:endParaRPr lang="en-US" dirty="0"/>
           </a:p>
         </p:txBody>
       </p:sp>
@@ -2251,7 +2250,7 @@
               <a:rPr lang="en-US" smtClean="0"/>
               <a:t>‹#›</a:t>
             </a:fld>
-            <a:endParaRPr lang="en-US"/>
+            <a:endParaRPr lang="en-US" dirty="0"/>
           </a:p>
         </p:txBody>
       </p:sp>
@@ -2769,9 +2768,9 @@
           <a:p>
             <a:fld id="{BEF3EF1F-4106-EF46-91A0-37C4FFBE3DFA}" type="datetimeFigureOut">
               <a:rPr lang="en-US" smtClean="0"/>
-              <a:t>12/20/18</a:t>
+              <a:t>12/21/18</a:t>
             </a:fld>
-            <a:endParaRPr lang="en-US"/>
+            <a:endParaRPr lang="en-US" dirty="0"/>
           </a:p>
         </p:txBody>
       </p:sp>
@@ -2790,7 +2789,7 @@
           <a:bodyPr/>
           <a:lstStyle/>
           <a:p>
-            <a:endParaRPr lang="en-US"/>
+            <a:endParaRPr lang="en-US" dirty="0"/>
           </a:p>
         </p:txBody>
       </p:sp>
@@ -2813,7 +2812,7 @@
               <a:rPr lang="en-US" smtClean="0"/>
               <a:t>‹#›</a:t>
             </a:fld>
-            <a:endParaRPr lang="en-US"/>
+            <a:endParaRPr lang="en-US" dirty="0"/>
           </a:p>
         </p:txBody>
       </p:sp>
@@ -3096,9 +3095,9 @@
           <a:p>
             <a:fld id="{BEF3EF1F-4106-EF46-91A0-37C4FFBE3DFA}" type="datetimeFigureOut">
               <a:rPr lang="en-US" smtClean="0"/>
-              <a:t>12/20/18</a:t>
+              <a:t>12/21/18</a:t>
             </a:fld>
-            <a:endParaRPr lang="en-US"/>
+            <a:endParaRPr lang="en-US" dirty="0"/>
           </a:p>
         </p:txBody>
       </p:sp>
@@ -3117,7 +3116,7 @@
           <a:bodyPr/>
           <a:lstStyle/>
           <a:p>
-            <a:endParaRPr lang="en-US"/>
+            <a:endParaRPr lang="en-US" dirty="0"/>
           </a:p>
         </p:txBody>
       </p:sp>
@@ -3140,7 +3139,7 @@
               <a:rPr lang="en-US" smtClean="0"/>
               <a:t>‹#›</a:t>
             </a:fld>
-            <a:endParaRPr lang="en-US"/>
+            <a:endParaRPr lang="en-US" dirty="0"/>
           </a:p>
         </p:txBody>
       </p:sp>
@@ -3307,9 +3306,9 @@
           <a:p>
             <a:fld id="{BEF3EF1F-4106-EF46-91A0-37C4FFBE3DFA}" type="datetimeFigureOut">
               <a:rPr lang="en-US" smtClean="0"/>
-              <a:t>12/20/18</a:t>
+              <a:t>12/21/18</a:t>
             </a:fld>
-            <a:endParaRPr lang="en-US"/>
+            <a:endParaRPr lang="en-US" dirty="0"/>
           </a:p>
         </p:txBody>
       </p:sp>
@@ -3328,7 +3327,7 @@
           <a:bodyPr/>
           <a:lstStyle/>
           <a:p>
-            <a:endParaRPr lang="en-US"/>
+            <a:endParaRPr lang="en-US" dirty="0"/>
           </a:p>
         </p:txBody>
       </p:sp>
@@ -3351,7 +3350,7 @@
               <a:rPr lang="en-US" smtClean="0"/>
               <a:t>‹#›</a:t>
             </a:fld>
-            <a:endParaRPr lang="en-US"/>
+            <a:endParaRPr lang="en-US" dirty="0"/>
           </a:p>
         </p:txBody>
       </p:sp>
@@ -3523,9 +3522,9 @@
           <a:p>
             <a:fld id="{BEF3EF1F-4106-EF46-91A0-37C4FFBE3DFA}" type="datetimeFigureOut">
               <a:rPr lang="en-US" smtClean="0"/>
-              <a:t>12/20/18</a:t>
+              <a:t>12/21/18</a:t>
             </a:fld>
-            <a:endParaRPr lang="en-US"/>
+            <a:endParaRPr lang="en-US" dirty="0"/>
           </a:p>
         </p:txBody>
       </p:sp>
@@ -3544,7 +3543,7 @@
           <a:bodyPr/>
           <a:lstStyle/>
           <a:p>
-            <a:endParaRPr lang="en-US"/>
+            <a:endParaRPr lang="en-US" dirty="0"/>
           </a:p>
         </p:txBody>
       </p:sp>
@@ -3567,7 +3566,7 @@
               <a:rPr lang="en-US" smtClean="0"/>
               <a:t>‹#›</a:t>
             </a:fld>
-            <a:endParaRPr lang="en-US"/>
+            <a:endParaRPr lang="en-US" dirty="0"/>
           </a:p>
         </p:txBody>
       </p:sp>
@@ -3729,9 +3728,9 @@
           <a:p>
             <a:fld id="{BEF3EF1F-4106-EF46-91A0-37C4FFBE3DFA}" type="datetimeFigureOut">
               <a:rPr lang="en-US" smtClean="0"/>
-              <a:t>12/20/18</a:t>
+              <a:t>12/21/18</a:t>
             </a:fld>
-            <a:endParaRPr lang="en-US"/>
+            <a:endParaRPr lang="en-US" dirty="0"/>
           </a:p>
         </p:txBody>
       </p:sp>
@@ -3750,7 +3749,7 @@
           <a:bodyPr/>
           <a:lstStyle/>
           <a:p>
-            <a:endParaRPr lang="en-US"/>
+            <a:endParaRPr lang="en-US" dirty="0"/>
           </a:p>
         </p:txBody>
       </p:sp>
@@ -3773,7 +3772,7 @@
               <a:rPr lang="en-US" smtClean="0"/>
               <a:t>‹#›</a:t>
             </a:fld>
-            <a:endParaRPr lang="en-US"/>
+            <a:endParaRPr lang="en-US" dirty="0"/>
           </a:p>
         </p:txBody>
       </p:sp>
@@ -4007,9 +4006,9 @@
           <a:p>
             <a:fld id="{BEF3EF1F-4106-EF46-91A0-37C4FFBE3DFA}" type="datetimeFigureOut">
               <a:rPr lang="en-US" smtClean="0"/>
-              <a:t>12/20/18</a:t>
+              <a:t>12/21/18</a:t>
             </a:fld>
-            <a:endParaRPr lang="en-US"/>
+            <a:endParaRPr lang="en-US" dirty="0"/>
           </a:p>
         </p:txBody>
       </p:sp>
@@ -4028,7 +4027,7 @@
           <a:bodyPr/>
           <a:lstStyle/>
           <a:p>
-            <a:endParaRPr lang="en-US"/>
+            <a:endParaRPr lang="en-US" dirty="0"/>
           </a:p>
         </p:txBody>
       </p:sp>
@@ -4051,7 +4050,7 @@
               <a:rPr lang="en-US" smtClean="0"/>
               <a:t>‹#›</a:t>
             </a:fld>
-            <a:endParaRPr lang="en-US"/>
+            <a:endParaRPr lang="en-US" dirty="0"/>
           </a:p>
         </p:txBody>
       </p:sp>
@@ -4273,9 +4272,9 @@
           <a:p>
             <a:fld id="{BEF3EF1F-4106-EF46-91A0-37C4FFBE3DFA}" type="datetimeFigureOut">
               <a:rPr lang="en-US" smtClean="0"/>
-              <a:t>12/20/18</a:t>
+              <a:t>12/21/18</a:t>
             </a:fld>
-            <a:endParaRPr lang="en-US"/>
+            <a:endParaRPr lang="en-US" dirty="0"/>
           </a:p>
         </p:txBody>
       </p:sp>
@@ -4294,7 +4293,7 @@
           <a:bodyPr/>
           <a:lstStyle/>
           <a:p>
-            <a:endParaRPr lang="en-US"/>
+            <a:endParaRPr lang="en-US" dirty="0"/>
           </a:p>
         </p:txBody>
       </p:sp>
@@ -4317,7 +4316,7 @@
               <a:rPr lang="en-US" smtClean="0"/>
               <a:t>‹#›</a:t>
             </a:fld>
-            <a:endParaRPr lang="en-US"/>
+            <a:endParaRPr lang="en-US" dirty="0"/>
           </a:p>
         </p:txBody>
       </p:sp>
@@ -4679,9 +4678,9 @@
           <a:p>
             <a:fld id="{BEF3EF1F-4106-EF46-91A0-37C4FFBE3DFA}" type="datetimeFigureOut">
               <a:rPr lang="en-US" smtClean="0"/>
-              <a:t>12/20/18</a:t>
+              <a:t>12/21/18</a:t>
             </a:fld>
-            <a:endParaRPr lang="en-US"/>
+            <a:endParaRPr lang="en-US" dirty="0"/>
           </a:p>
         </p:txBody>
       </p:sp>
@@ -4700,7 +4699,7 @@
           <a:bodyPr/>
           <a:lstStyle/>
           <a:p>
-            <a:endParaRPr lang="en-US"/>
+            <a:endParaRPr lang="en-US" dirty="0"/>
           </a:p>
         </p:txBody>
       </p:sp>
@@ -4723,7 +4722,7 @@
               <a:rPr lang="en-US" smtClean="0"/>
               <a:t>‹#›</a:t>
             </a:fld>
-            <a:endParaRPr lang="en-US"/>
+            <a:endParaRPr lang="en-US" dirty="0"/>
           </a:p>
         </p:txBody>
       </p:sp>
@@ -4838,9 +4837,9 @@
           <a:p>
             <a:fld id="{BEF3EF1F-4106-EF46-91A0-37C4FFBE3DFA}" type="datetimeFigureOut">
               <a:rPr lang="en-US" smtClean="0"/>
-              <a:t>12/20/18</a:t>
+              <a:t>12/21/18</a:t>
             </a:fld>
-            <a:endParaRPr lang="en-US"/>
+            <a:endParaRPr lang="en-US" dirty="0"/>
           </a:p>
         </p:txBody>
       </p:sp>
@@ -4859,7 +4858,7 @@
           <a:bodyPr/>
           <a:lstStyle/>
           <a:p>
-            <a:endParaRPr lang="en-US"/>
+            <a:endParaRPr lang="en-US" dirty="0"/>
           </a:p>
         </p:txBody>
       </p:sp>
@@ -4882,7 +4881,7 @@
               <a:rPr lang="en-US" smtClean="0"/>
               <a:t>‹#›</a:t>
             </a:fld>
-            <a:endParaRPr lang="en-US"/>
+            <a:endParaRPr lang="en-US" dirty="0"/>
           </a:p>
         </p:txBody>
       </p:sp>
@@ -4963,9 +4962,9 @@
           <a:p>
             <a:fld id="{BEF3EF1F-4106-EF46-91A0-37C4FFBE3DFA}" type="datetimeFigureOut">
               <a:rPr lang="en-US" smtClean="0"/>
-              <a:t>12/20/18</a:t>
+              <a:t>12/21/18</a:t>
             </a:fld>
-            <a:endParaRPr lang="en-US"/>
+            <a:endParaRPr lang="en-US" dirty="0"/>
           </a:p>
         </p:txBody>
       </p:sp>
@@ -4984,7 +4983,7 @@
           <a:bodyPr/>
           <a:lstStyle/>
           <a:p>
-            <a:endParaRPr lang="en-US"/>
+            <a:endParaRPr lang="en-US" dirty="0"/>
           </a:p>
         </p:txBody>
       </p:sp>
@@ -5007,7 +5006,7 @@
               <a:rPr lang="en-US" smtClean="0"/>
               <a:t>‹#›</a:t>
             </a:fld>
-            <a:endParaRPr lang="en-US"/>
+            <a:endParaRPr lang="en-US" dirty="0"/>
           </a:p>
         </p:txBody>
       </p:sp>
@@ -5248,9 +5247,9 @@
           <a:p>
             <a:fld id="{BEF3EF1F-4106-EF46-91A0-37C4FFBE3DFA}" type="datetimeFigureOut">
               <a:rPr lang="en-US" smtClean="0"/>
-              <a:t>12/20/18</a:t>
+              <a:t>12/21/18</a:t>
             </a:fld>
-            <a:endParaRPr lang="en-US"/>
+            <a:endParaRPr lang="en-US" dirty="0"/>
           </a:p>
         </p:txBody>
       </p:sp>
@@ -5269,7 +5268,7 @@
           <a:bodyPr/>
           <a:lstStyle/>
           <a:p>
-            <a:endParaRPr lang="en-US"/>
+            <a:endParaRPr lang="en-US" dirty="0"/>
           </a:p>
         </p:txBody>
       </p:sp>
@@ -5292,7 +5291,7 @@
               <a:rPr lang="en-US" smtClean="0"/>
               <a:t>‹#›</a:t>
             </a:fld>
-            <a:endParaRPr lang="en-US"/>
+            <a:endParaRPr lang="en-US" dirty="0"/>
           </a:p>
         </p:txBody>
       </p:sp>
@@ -5451,10 +5450,9 @@
               <a:buNone/>
             </a:pPr>
             <a:r>
-              <a:rPr lang="en-US"/>
+              <a:rPr lang="en-US" dirty="0"/>
               <a:t>Click icon to add picture</a:t>
             </a:r>
-            <a:endParaRPr lang="en-US" dirty="0"/>
           </a:p>
         </p:txBody>
       </p:sp>
@@ -5542,9 +5540,9 @@
           <a:p>
             <a:fld id="{BEF3EF1F-4106-EF46-91A0-37C4FFBE3DFA}" type="datetimeFigureOut">
               <a:rPr lang="en-US" smtClean="0"/>
-              <a:t>12/20/18</a:t>
+              <a:t>12/21/18</a:t>
             </a:fld>
-            <a:endParaRPr lang="en-US"/>
+            <a:endParaRPr lang="en-US" dirty="0"/>
           </a:p>
         </p:txBody>
       </p:sp>
@@ -5563,7 +5561,7 @@
           <a:bodyPr/>
           <a:lstStyle/>
           <a:p>
-            <a:endParaRPr lang="en-US"/>
+            <a:endParaRPr lang="en-US" dirty="0"/>
           </a:p>
         </p:txBody>
       </p:sp>
@@ -5586,7 +5584,7 @@
               <a:rPr lang="en-US" smtClean="0"/>
               <a:t>‹#›</a:t>
             </a:fld>
-            <a:endParaRPr lang="en-US"/>
+            <a:endParaRPr lang="en-US" dirty="0"/>
           </a:p>
         </p:txBody>
       </p:sp>
@@ -5756,9 +5754,9 @@
           <a:p>
             <a:fld id="{BEF3EF1F-4106-EF46-91A0-37C4FFBE3DFA}" type="datetimeFigureOut">
               <a:rPr lang="en-US" smtClean="0"/>
-              <a:t>12/20/18</a:t>
+              <a:t>12/21/18</a:t>
             </a:fld>
-            <a:endParaRPr lang="en-US"/>
+            <a:endParaRPr lang="en-US" dirty="0"/>
           </a:p>
         </p:txBody>
       </p:sp>
@@ -5795,7 +5793,7 @@
             </a:lvl1pPr>
           </a:lstStyle>
           <a:p>
-            <a:endParaRPr lang="en-US"/>
+            <a:endParaRPr lang="en-US" dirty="0"/>
           </a:p>
         </p:txBody>
       </p:sp>
@@ -5836,7 +5834,7 @@
               <a:rPr lang="en-US" smtClean="0"/>
               <a:t>‹#›</a:t>
             </a:fld>
-            <a:endParaRPr lang="en-US"/>
+            <a:endParaRPr lang="en-US" dirty="0"/>
           </a:p>
         </p:txBody>
       </p:sp>
@@ -6281,6 +6279,827 @@
       </p:grpSpPr>
       <p:sp>
         <p:nvSpPr>
+          <p:cNvPr id="44" name="TextBox 43">
+            <a:extLst>
+              <a:ext uri="{FF2B5EF4-FFF2-40B4-BE49-F238E27FC236}">
+                <a16:creationId xmlns:a16="http://schemas.microsoft.com/office/drawing/2014/main" id="{632C9929-8F16-114B-9508-A28BFFF9591D}"/>
+              </a:ext>
+            </a:extLst>
+          </p:cNvPr>
+          <p:cNvSpPr txBox="1"/>
+          <p:nvPr/>
+        </p:nvSpPr>
+        <p:spPr>
+          <a:xfrm>
+            <a:off x="800100" y="24904257"/>
+            <a:ext cx="12344400" cy="7330449"/>
+          </a:xfrm>
+          <a:prstGeom prst="rect">
+            <a:avLst/>
+          </a:prstGeom>
+          <a:solidFill>
+            <a:schemeClr val="tx1"/>
+          </a:solidFill>
+        </p:spPr>
+        <p:txBody>
+          <a:bodyPr wrap="square" lIns="182880" tIns="182880" rIns="182880" bIns="182880" rtlCol="0">
+            <a:noAutofit/>
+          </a:bodyPr>
+          <a:lstStyle/>
+          <a:p>
+            <a:r>
+              <a:rPr lang="en-US" sz="3600" dirty="0">
+                <a:solidFill>
+                  <a:srgbClr val="00B0F0"/>
+                </a:solidFill>
+                <a:latin typeface="Times New Roman" panose="02020603050405020304" pitchFamily="18" charset="0"/>
+                <a:cs typeface="Times New Roman" panose="02020603050405020304" pitchFamily="18" charset="0"/>
+              </a:rPr>
+              <a:t>3. Effect of the GC on the Magellanic Stream</a:t>
+            </a:r>
+          </a:p>
+          <a:p>
+            <a:r>
+              <a:rPr lang="en-US" sz="2800" dirty="0">
+                <a:solidFill>
+                  <a:schemeClr val="bg1"/>
+                </a:solidFill>
+                <a:latin typeface="Arial" panose="020B0604020202020204" pitchFamily="34" charset="0"/>
+                <a:cs typeface="Arial" panose="020B0604020202020204" pitchFamily="34" charset="0"/>
+              </a:rPr>
+              <a:t>The plot below shows the ratio of total column density for a low/high ion pair for each sightline in our sample. The pairs will be either Si IV/Si II or           C IV/ CII. Sightlines with white circles do not have measurements for those ions from VoigtFit. The Stream sightlines 8, 10, 11, and 12 (where we would expect the effects from the GC to be) all have elevated high-ion density. </a:t>
+            </a:r>
+          </a:p>
+          <a:p>
+            <a:endParaRPr lang="en-US" sz="2800" dirty="0">
+              <a:solidFill>
+                <a:schemeClr val="bg1"/>
+              </a:solidFill>
+              <a:latin typeface="Arial" panose="020B0604020202020204" pitchFamily="34" charset="0"/>
+              <a:cs typeface="Arial" panose="020B0604020202020204" pitchFamily="34" charset="0"/>
+            </a:endParaRPr>
+          </a:p>
+          <a:p>
+            <a:endParaRPr lang="en-US" sz="2800" dirty="0">
+              <a:solidFill>
+                <a:schemeClr val="bg1"/>
+              </a:solidFill>
+              <a:latin typeface="Arial" panose="020B0604020202020204" pitchFamily="34" charset="0"/>
+              <a:cs typeface="Arial" panose="020B0604020202020204" pitchFamily="34" charset="0"/>
+            </a:endParaRPr>
+          </a:p>
+          <a:p>
+            <a:endParaRPr lang="en-US" sz="2800" dirty="0">
+              <a:solidFill>
+                <a:schemeClr val="bg1"/>
+              </a:solidFill>
+              <a:latin typeface="Arial" panose="020B0604020202020204" pitchFamily="34" charset="0"/>
+              <a:cs typeface="Arial" panose="020B0604020202020204" pitchFamily="34" charset="0"/>
+            </a:endParaRPr>
+          </a:p>
+          <a:p>
+            <a:endParaRPr lang="en-US" sz="2800" dirty="0">
+              <a:solidFill>
+                <a:schemeClr val="bg1"/>
+              </a:solidFill>
+              <a:latin typeface="Arial" panose="020B0604020202020204" pitchFamily="34" charset="0"/>
+              <a:cs typeface="Arial" panose="020B0604020202020204" pitchFamily="34" charset="0"/>
+            </a:endParaRPr>
+          </a:p>
+          <a:p>
+            <a:endParaRPr lang="en-US" sz="3600" dirty="0">
+              <a:solidFill>
+                <a:srgbClr val="00B0F0"/>
+              </a:solidFill>
+            </a:endParaRPr>
+          </a:p>
+          <a:p>
+            <a:endParaRPr lang="en-US" sz="3600" dirty="0">
+              <a:solidFill>
+                <a:srgbClr val="00B0F0"/>
+              </a:solidFill>
+            </a:endParaRPr>
+          </a:p>
+          <a:p>
+            <a:endParaRPr lang="en-US" sz="3600" dirty="0">
+              <a:solidFill>
+                <a:srgbClr val="00B0F0"/>
+              </a:solidFill>
+            </a:endParaRPr>
+          </a:p>
+          <a:p>
+            <a:endParaRPr lang="en-US" sz="3600" dirty="0">
+              <a:solidFill>
+                <a:srgbClr val="00B0F0"/>
+              </a:solidFill>
+            </a:endParaRPr>
+          </a:p>
+          <a:p>
+            <a:endParaRPr lang="en-US" sz="3600" dirty="0">
+              <a:solidFill>
+                <a:srgbClr val="00B0F0"/>
+              </a:solidFill>
+            </a:endParaRPr>
+          </a:p>
+          <a:p>
+            <a:endParaRPr lang="en-US" sz="3600" dirty="0">
+              <a:solidFill>
+                <a:srgbClr val="00B0F0"/>
+              </a:solidFill>
+            </a:endParaRPr>
+          </a:p>
+          <a:p>
+            <a:endParaRPr lang="en-US" sz="3600" dirty="0">
+              <a:solidFill>
+                <a:srgbClr val="00B0F0"/>
+              </a:solidFill>
+            </a:endParaRPr>
+          </a:p>
+          <a:p>
+            <a:endParaRPr lang="en-US" sz="3600" dirty="0">
+              <a:solidFill>
+                <a:srgbClr val="00B0F0"/>
+              </a:solidFill>
+            </a:endParaRPr>
+          </a:p>
+        </p:txBody>
+      </p:sp>
+      <p:grpSp>
+        <p:nvGrpSpPr>
+          <p:cNvPr id="9" name="Group 8">
+            <a:extLst>
+              <a:ext uri="{FF2B5EF4-FFF2-40B4-BE49-F238E27FC236}">
+                <a16:creationId xmlns:a16="http://schemas.microsoft.com/office/drawing/2014/main" id="{B5C90DD3-4221-B74D-9C56-6D0E74B3CA49}"/>
+              </a:ext>
+            </a:extLst>
+          </p:cNvPr>
+          <p:cNvGrpSpPr/>
+          <p:nvPr/>
+        </p:nvGrpSpPr>
+        <p:grpSpPr>
+          <a:xfrm>
+            <a:off x="1795119" y="27766806"/>
+            <a:ext cx="10115324" cy="4467903"/>
+            <a:chOff x="3219821" y="27579861"/>
+            <a:chExt cx="9639162" cy="4257586"/>
+          </a:xfrm>
+        </p:grpSpPr>
+        <p:grpSp>
+          <p:nvGrpSpPr>
+            <p:cNvPr id="8" name="Group 7">
+              <a:extLst>
+                <a:ext uri="{FF2B5EF4-FFF2-40B4-BE49-F238E27FC236}">
+                  <a16:creationId xmlns:a16="http://schemas.microsoft.com/office/drawing/2014/main" id="{BA547D00-C043-BF4E-86F0-F7A8159F22C6}"/>
+                </a:ext>
+              </a:extLst>
+            </p:cNvPr>
+            <p:cNvGrpSpPr/>
+            <p:nvPr/>
+          </p:nvGrpSpPr>
+          <p:grpSpPr>
+            <a:xfrm>
+              <a:off x="3219821" y="27768822"/>
+              <a:ext cx="8393452" cy="4068625"/>
+              <a:chOff x="1473204" y="25940022"/>
+              <a:chExt cx="8393452" cy="4068625"/>
+            </a:xfrm>
+          </p:grpSpPr>
+          <p:pic>
+            <p:nvPicPr>
+              <p:cNvPr id="7" name="Picture 6">
+                <a:extLst>
+                  <a:ext uri="{FF2B5EF4-FFF2-40B4-BE49-F238E27FC236}">
+                    <a16:creationId xmlns:a16="http://schemas.microsoft.com/office/drawing/2014/main" id="{647CDF9E-8EC8-B342-9D75-B045EA8E3012}"/>
+                  </a:ext>
+                </a:extLst>
+              </p:cNvPr>
+              <p:cNvPicPr>
+                <a:picLocks noChangeAspect="1"/>
+              </p:cNvPicPr>
+              <p:nvPr/>
+            </p:nvPicPr>
+            <p:blipFill rotWithShape="1">
+              <a:blip r:embed="rId3"/>
+              <a:srcRect t="11967" r="8208" b="28707"/>
+              <a:stretch/>
+            </p:blipFill>
+            <p:spPr>
+              <a:xfrm>
+                <a:off x="1473204" y="25940022"/>
+                <a:ext cx="8393452" cy="4068625"/>
+              </a:xfrm>
+              <a:prstGeom prst="rect">
+                <a:avLst/>
+              </a:prstGeom>
+            </p:spPr>
+          </p:pic>
+          <p:sp>
+            <p:nvSpPr>
+              <p:cNvPr id="4" name="TextBox 3">
+                <a:extLst>
+                  <a:ext uri="{FF2B5EF4-FFF2-40B4-BE49-F238E27FC236}">
+                    <a16:creationId xmlns:a16="http://schemas.microsoft.com/office/drawing/2014/main" id="{5CF3A238-889D-DA48-B24D-ADB690194D78}"/>
+                  </a:ext>
+                </a:extLst>
+              </p:cNvPr>
+              <p:cNvSpPr txBox="1"/>
+              <p:nvPr/>
+            </p:nvSpPr>
+            <p:spPr>
+              <a:xfrm>
+                <a:off x="4998284" y="28863954"/>
+                <a:ext cx="327334" cy="400110"/>
+              </a:xfrm>
+              <a:prstGeom prst="rect">
+                <a:avLst/>
+              </a:prstGeom>
+              <a:noFill/>
+            </p:spPr>
+            <p:txBody>
+              <a:bodyPr wrap="none" rtlCol="0">
+                <a:spAutoFit/>
+              </a:bodyPr>
+              <a:lstStyle/>
+              <a:p>
+                <a:r>
+                  <a:rPr lang="en-US" sz="2000" dirty="0">
+                    <a:solidFill>
+                      <a:schemeClr val="bg1"/>
+                    </a:solidFill>
+                    <a:latin typeface="Arial" panose="020B0604020202020204" pitchFamily="34" charset="0"/>
+                    <a:cs typeface="Arial" panose="020B0604020202020204" pitchFamily="34" charset="0"/>
+                  </a:rPr>
+                  <a:t>8</a:t>
+                </a:r>
+              </a:p>
+            </p:txBody>
+          </p:sp>
+          <p:sp>
+            <p:nvSpPr>
+              <p:cNvPr id="31" name="TextBox 30">
+                <a:extLst>
+                  <a:ext uri="{FF2B5EF4-FFF2-40B4-BE49-F238E27FC236}">
+                    <a16:creationId xmlns:a16="http://schemas.microsoft.com/office/drawing/2014/main" id="{4B21B1D1-6105-DC4A-8FA5-DE7E79D99F40}"/>
+                  </a:ext>
+                </a:extLst>
+              </p:cNvPr>
+              <p:cNvSpPr txBox="1"/>
+              <p:nvPr/>
+            </p:nvSpPr>
+            <p:spPr>
+              <a:xfrm>
+                <a:off x="8192705" y="26820600"/>
+                <a:ext cx="327334" cy="400110"/>
+              </a:xfrm>
+              <a:prstGeom prst="rect">
+                <a:avLst/>
+              </a:prstGeom>
+              <a:noFill/>
+            </p:spPr>
+            <p:txBody>
+              <a:bodyPr wrap="none" rtlCol="0">
+                <a:spAutoFit/>
+              </a:bodyPr>
+              <a:lstStyle/>
+              <a:p>
+                <a:r>
+                  <a:rPr lang="en-US" sz="2000" dirty="0">
+                    <a:solidFill>
+                      <a:schemeClr val="bg1"/>
+                    </a:solidFill>
+                    <a:latin typeface="Arial" panose="020B0604020202020204" pitchFamily="34" charset="0"/>
+                    <a:cs typeface="Arial" panose="020B0604020202020204" pitchFamily="34" charset="0"/>
+                  </a:rPr>
+                  <a:t>3</a:t>
+                </a:r>
+              </a:p>
+            </p:txBody>
+          </p:sp>
+          <p:sp>
+            <p:nvSpPr>
+              <p:cNvPr id="63" name="TextBox 62">
+                <a:extLst>
+                  <a:ext uri="{FF2B5EF4-FFF2-40B4-BE49-F238E27FC236}">
+                    <a16:creationId xmlns:a16="http://schemas.microsoft.com/office/drawing/2014/main" id="{E478750B-3079-AB4C-81A4-41681656820B}"/>
+                  </a:ext>
+                </a:extLst>
+              </p:cNvPr>
+              <p:cNvSpPr txBox="1"/>
+              <p:nvPr/>
+            </p:nvSpPr>
+            <p:spPr>
+              <a:xfrm>
+                <a:off x="7252826" y="28193123"/>
+                <a:ext cx="327334" cy="400110"/>
+              </a:xfrm>
+              <a:prstGeom prst="rect">
+                <a:avLst/>
+              </a:prstGeom>
+              <a:noFill/>
+            </p:spPr>
+            <p:txBody>
+              <a:bodyPr wrap="none" rtlCol="0">
+                <a:spAutoFit/>
+              </a:bodyPr>
+              <a:lstStyle/>
+              <a:p>
+                <a:r>
+                  <a:rPr lang="en-US" sz="2000" dirty="0">
+                    <a:solidFill>
+                      <a:schemeClr val="bg1"/>
+                    </a:solidFill>
+                    <a:latin typeface="Arial" panose="020B0604020202020204" pitchFamily="34" charset="0"/>
+                    <a:cs typeface="Arial" panose="020B0604020202020204" pitchFamily="34" charset="0"/>
+                  </a:rPr>
+                  <a:t>6</a:t>
+                </a:r>
+              </a:p>
+            </p:txBody>
+          </p:sp>
+          <p:sp>
+            <p:nvSpPr>
+              <p:cNvPr id="64" name="TextBox 63">
+                <a:extLst>
+                  <a:ext uri="{FF2B5EF4-FFF2-40B4-BE49-F238E27FC236}">
+                    <a16:creationId xmlns:a16="http://schemas.microsoft.com/office/drawing/2014/main" id="{84DBB45A-6C8A-A040-916F-D9015D47B861}"/>
+                  </a:ext>
+                </a:extLst>
+              </p:cNvPr>
+              <p:cNvSpPr txBox="1"/>
+              <p:nvPr/>
+            </p:nvSpPr>
+            <p:spPr>
+              <a:xfrm>
+                <a:off x="5293203" y="28890566"/>
+                <a:ext cx="450957" cy="400110"/>
+              </a:xfrm>
+              <a:prstGeom prst="rect">
+                <a:avLst/>
+              </a:prstGeom>
+              <a:noFill/>
+            </p:spPr>
+            <p:txBody>
+              <a:bodyPr wrap="none" rtlCol="0">
+                <a:spAutoFit/>
+              </a:bodyPr>
+              <a:lstStyle/>
+              <a:p>
+                <a:r>
+                  <a:rPr lang="en-US" sz="2000" dirty="0">
+                    <a:solidFill>
+                      <a:schemeClr val="bg1"/>
+                    </a:solidFill>
+                    <a:latin typeface="Arial" panose="020B0604020202020204" pitchFamily="34" charset="0"/>
+                    <a:cs typeface="Arial" panose="020B0604020202020204" pitchFamily="34" charset="0"/>
+                  </a:rPr>
+                  <a:t>11</a:t>
+                </a:r>
+              </a:p>
+            </p:txBody>
+          </p:sp>
+          <p:sp>
+            <p:nvSpPr>
+              <p:cNvPr id="65" name="TextBox 64">
+                <a:extLst>
+                  <a:ext uri="{FF2B5EF4-FFF2-40B4-BE49-F238E27FC236}">
+                    <a16:creationId xmlns:a16="http://schemas.microsoft.com/office/drawing/2014/main" id="{6DED153E-5C78-A34D-B366-F8324B9ED7A6}"/>
+                  </a:ext>
+                </a:extLst>
+              </p:cNvPr>
+              <p:cNvSpPr txBox="1"/>
+              <p:nvPr/>
+            </p:nvSpPr>
+            <p:spPr>
+              <a:xfrm>
+                <a:off x="7680916" y="26760044"/>
+                <a:ext cx="327334" cy="400110"/>
+              </a:xfrm>
+              <a:prstGeom prst="rect">
+                <a:avLst/>
+              </a:prstGeom>
+              <a:noFill/>
+            </p:spPr>
+            <p:txBody>
+              <a:bodyPr wrap="none" rtlCol="0">
+                <a:spAutoFit/>
+              </a:bodyPr>
+              <a:lstStyle/>
+              <a:p>
+                <a:r>
+                  <a:rPr lang="en-US" sz="2000" dirty="0">
+                    <a:solidFill>
+                      <a:schemeClr val="bg1"/>
+                    </a:solidFill>
+                    <a:latin typeface="Arial" panose="020B0604020202020204" pitchFamily="34" charset="0"/>
+                    <a:cs typeface="Arial" panose="020B0604020202020204" pitchFamily="34" charset="0"/>
+                  </a:rPr>
+                  <a:t>1</a:t>
+                </a:r>
+              </a:p>
+            </p:txBody>
+          </p:sp>
+          <p:sp>
+            <p:nvSpPr>
+              <p:cNvPr id="66" name="TextBox 65">
+                <a:extLst>
+                  <a:ext uri="{FF2B5EF4-FFF2-40B4-BE49-F238E27FC236}">
+                    <a16:creationId xmlns:a16="http://schemas.microsoft.com/office/drawing/2014/main" id="{E8BDCB1B-C0F7-3646-A755-CD616C0D9795}"/>
+                  </a:ext>
+                </a:extLst>
+              </p:cNvPr>
+              <p:cNvSpPr txBox="1"/>
+              <p:nvPr/>
+            </p:nvSpPr>
+            <p:spPr>
+              <a:xfrm>
+                <a:off x="4433117" y="28931161"/>
+                <a:ext cx="497265" cy="415766"/>
+              </a:xfrm>
+              <a:prstGeom prst="rect">
+                <a:avLst/>
+              </a:prstGeom>
+              <a:noFill/>
+            </p:spPr>
+            <p:txBody>
+              <a:bodyPr wrap="square" rtlCol="0">
+                <a:spAutoFit/>
+              </a:bodyPr>
+              <a:lstStyle/>
+              <a:p>
+                <a:r>
+                  <a:rPr lang="en-US" sz="2000" dirty="0">
+                    <a:solidFill>
+                      <a:schemeClr val="bg1"/>
+                    </a:solidFill>
+                    <a:latin typeface="Arial" panose="020B0604020202020204" pitchFamily="34" charset="0"/>
+                    <a:cs typeface="Arial" panose="020B0604020202020204" pitchFamily="34" charset="0"/>
+                  </a:rPr>
+                  <a:t>12</a:t>
+                </a:r>
+              </a:p>
+            </p:txBody>
+          </p:sp>
+          <p:sp>
+            <p:nvSpPr>
+              <p:cNvPr id="67" name="TextBox 66">
+                <a:extLst>
+                  <a:ext uri="{FF2B5EF4-FFF2-40B4-BE49-F238E27FC236}">
+                    <a16:creationId xmlns:a16="http://schemas.microsoft.com/office/drawing/2014/main" id="{A9AE0EEF-FA1C-4E41-9D01-8450D9413093}"/>
+                  </a:ext>
+                </a:extLst>
+              </p:cNvPr>
+              <p:cNvSpPr txBox="1"/>
+              <p:nvPr/>
+            </p:nvSpPr>
+            <p:spPr>
+              <a:xfrm>
+                <a:off x="7913091" y="26473880"/>
+                <a:ext cx="327334" cy="400110"/>
+              </a:xfrm>
+              <a:prstGeom prst="rect">
+                <a:avLst/>
+              </a:prstGeom>
+              <a:noFill/>
+            </p:spPr>
+            <p:txBody>
+              <a:bodyPr wrap="none" rtlCol="0">
+                <a:spAutoFit/>
+              </a:bodyPr>
+              <a:lstStyle/>
+              <a:p>
+                <a:r>
+                  <a:rPr lang="en-US" sz="2000" dirty="0">
+                    <a:solidFill>
+                      <a:schemeClr val="bg1"/>
+                    </a:solidFill>
+                    <a:latin typeface="Arial" panose="020B0604020202020204" pitchFamily="34" charset="0"/>
+                    <a:cs typeface="Arial" panose="020B0604020202020204" pitchFamily="34" charset="0"/>
+                  </a:rPr>
+                  <a:t>4</a:t>
+                </a:r>
+              </a:p>
+            </p:txBody>
+          </p:sp>
+          <p:sp>
+            <p:nvSpPr>
+              <p:cNvPr id="68" name="TextBox 67">
+                <a:extLst>
+                  <a:ext uri="{FF2B5EF4-FFF2-40B4-BE49-F238E27FC236}">
+                    <a16:creationId xmlns:a16="http://schemas.microsoft.com/office/drawing/2014/main" id="{B271755F-BB4D-224B-869B-5516F174B883}"/>
+                  </a:ext>
+                </a:extLst>
+              </p:cNvPr>
+              <p:cNvSpPr txBox="1"/>
+              <p:nvPr/>
+            </p:nvSpPr>
+            <p:spPr>
+              <a:xfrm>
+                <a:off x="7972979" y="27169614"/>
+                <a:ext cx="327334" cy="400110"/>
+              </a:xfrm>
+              <a:prstGeom prst="rect">
+                <a:avLst/>
+              </a:prstGeom>
+              <a:noFill/>
+            </p:spPr>
+            <p:txBody>
+              <a:bodyPr wrap="none" rtlCol="0">
+                <a:spAutoFit/>
+              </a:bodyPr>
+              <a:lstStyle/>
+              <a:p>
+                <a:r>
+                  <a:rPr lang="en-US" sz="2000" dirty="0">
+                    <a:solidFill>
+                      <a:schemeClr val="bg1"/>
+                    </a:solidFill>
+                    <a:latin typeface="Arial" panose="020B0604020202020204" pitchFamily="34" charset="0"/>
+                    <a:cs typeface="Arial" panose="020B0604020202020204" pitchFamily="34" charset="0"/>
+                  </a:rPr>
+                  <a:t>5</a:t>
+                </a:r>
+              </a:p>
+            </p:txBody>
+          </p:sp>
+          <p:sp>
+            <p:nvSpPr>
+              <p:cNvPr id="69" name="TextBox 68">
+                <a:extLst>
+                  <a:ext uri="{FF2B5EF4-FFF2-40B4-BE49-F238E27FC236}">
+                    <a16:creationId xmlns:a16="http://schemas.microsoft.com/office/drawing/2014/main" id="{EAE4D06C-59FE-B64D-A240-6E44DD2A059B}"/>
+                  </a:ext>
+                </a:extLst>
+              </p:cNvPr>
+              <p:cNvSpPr txBox="1"/>
+              <p:nvPr/>
+            </p:nvSpPr>
+            <p:spPr>
+              <a:xfrm>
+                <a:off x="5406176" y="29293576"/>
+                <a:ext cx="469999" cy="400110"/>
+              </a:xfrm>
+              <a:prstGeom prst="rect">
+                <a:avLst/>
+              </a:prstGeom>
+              <a:noFill/>
+            </p:spPr>
+            <p:txBody>
+              <a:bodyPr wrap="none" rtlCol="0">
+                <a:spAutoFit/>
+              </a:bodyPr>
+              <a:lstStyle/>
+              <a:p>
+                <a:r>
+                  <a:rPr lang="en-US" sz="2000" dirty="0">
+                    <a:solidFill>
+                      <a:schemeClr val="bg1"/>
+                    </a:solidFill>
+                    <a:latin typeface="Arial" panose="020B0604020202020204" pitchFamily="34" charset="0"/>
+                    <a:cs typeface="Arial" panose="020B0604020202020204" pitchFamily="34" charset="0"/>
+                  </a:rPr>
+                  <a:t>10</a:t>
+                </a:r>
+              </a:p>
+            </p:txBody>
+          </p:sp>
+          <p:sp>
+            <p:nvSpPr>
+              <p:cNvPr id="70" name="TextBox 69">
+                <a:extLst>
+                  <a:ext uri="{FF2B5EF4-FFF2-40B4-BE49-F238E27FC236}">
+                    <a16:creationId xmlns:a16="http://schemas.microsoft.com/office/drawing/2014/main" id="{7742E49E-3D34-3B47-993A-C925C908B87C}"/>
+                  </a:ext>
+                </a:extLst>
+              </p:cNvPr>
+              <p:cNvSpPr txBox="1"/>
+              <p:nvPr/>
+            </p:nvSpPr>
+            <p:spPr>
+              <a:xfrm>
+                <a:off x="7318728" y="27061722"/>
+                <a:ext cx="327334" cy="400110"/>
+              </a:xfrm>
+              <a:prstGeom prst="rect">
+                <a:avLst/>
+              </a:prstGeom>
+              <a:noFill/>
+            </p:spPr>
+            <p:txBody>
+              <a:bodyPr wrap="none" rtlCol="0">
+                <a:spAutoFit/>
+              </a:bodyPr>
+              <a:lstStyle/>
+              <a:p>
+                <a:r>
+                  <a:rPr lang="en-US" sz="2000" dirty="0">
+                    <a:solidFill>
+                      <a:schemeClr val="bg1"/>
+                    </a:solidFill>
+                    <a:latin typeface="Arial" panose="020B0604020202020204" pitchFamily="34" charset="0"/>
+                    <a:cs typeface="Arial" panose="020B0604020202020204" pitchFamily="34" charset="0"/>
+                  </a:rPr>
+                  <a:t>2</a:t>
+                </a:r>
+              </a:p>
+            </p:txBody>
+          </p:sp>
+          <p:cxnSp>
+            <p:nvCxnSpPr>
+              <p:cNvPr id="71" name="Straight Arrow Connector 70">
+                <a:extLst>
+                  <a:ext uri="{FF2B5EF4-FFF2-40B4-BE49-F238E27FC236}">
+                    <a16:creationId xmlns:a16="http://schemas.microsoft.com/office/drawing/2014/main" id="{5CCBEAED-6CB6-2E42-9F3E-A865E48B4260}"/>
+                  </a:ext>
+                </a:extLst>
+              </p:cNvPr>
+              <p:cNvCxnSpPr>
+                <a:cxnSpLocks/>
+              </p:cNvCxnSpPr>
+              <p:nvPr/>
+            </p:nvCxnSpPr>
+            <p:spPr>
+              <a:xfrm>
+                <a:off x="7849693" y="27079976"/>
+                <a:ext cx="0" cy="170156"/>
+              </a:xfrm>
+              <a:prstGeom prst="straightConnector1">
+                <a:avLst/>
+              </a:prstGeom>
+              <a:ln>
+                <a:tailEnd type="triangle"/>
+              </a:ln>
+            </p:spPr>
+            <p:style>
+              <a:lnRef idx="1">
+                <a:schemeClr val="dk1"/>
+              </a:lnRef>
+              <a:fillRef idx="0">
+                <a:schemeClr val="dk1"/>
+              </a:fillRef>
+              <a:effectRef idx="0">
+                <a:schemeClr val="dk1"/>
+              </a:effectRef>
+              <a:fontRef idx="minor">
+                <a:schemeClr val="tx1"/>
+              </a:fontRef>
+            </p:style>
+          </p:cxnSp>
+          <p:sp>
+            <p:nvSpPr>
+              <p:cNvPr id="73" name="TextBox 72">
+                <a:extLst>
+                  <a:ext uri="{FF2B5EF4-FFF2-40B4-BE49-F238E27FC236}">
+                    <a16:creationId xmlns:a16="http://schemas.microsoft.com/office/drawing/2014/main" id="{0EBC902F-20E1-A743-BD22-F8F42362955B}"/>
+                  </a:ext>
+                </a:extLst>
+              </p:cNvPr>
+              <p:cNvSpPr txBox="1"/>
+              <p:nvPr/>
+            </p:nvSpPr>
+            <p:spPr>
+              <a:xfrm>
+                <a:off x="7041194" y="28886349"/>
+                <a:ext cx="327334" cy="400110"/>
+              </a:xfrm>
+              <a:prstGeom prst="rect">
+                <a:avLst/>
+              </a:prstGeom>
+              <a:noFill/>
+            </p:spPr>
+            <p:txBody>
+              <a:bodyPr wrap="none" rtlCol="0">
+                <a:spAutoFit/>
+              </a:bodyPr>
+              <a:lstStyle/>
+              <a:p>
+                <a:r>
+                  <a:rPr lang="en-US" sz="2000" dirty="0">
+                    <a:solidFill>
+                      <a:schemeClr val="bg1"/>
+                    </a:solidFill>
+                    <a:latin typeface="Arial" panose="020B0604020202020204" pitchFamily="34" charset="0"/>
+                    <a:cs typeface="Arial" panose="020B0604020202020204" pitchFamily="34" charset="0"/>
+                  </a:rPr>
+                  <a:t>9</a:t>
+                </a:r>
+              </a:p>
+            </p:txBody>
+          </p:sp>
+          <p:sp>
+            <p:nvSpPr>
+              <p:cNvPr id="81" name="TextBox 80">
+                <a:extLst>
+                  <a:ext uri="{FF2B5EF4-FFF2-40B4-BE49-F238E27FC236}">
+                    <a16:creationId xmlns:a16="http://schemas.microsoft.com/office/drawing/2014/main" id="{B2125EE0-3617-4E48-9354-CA719591449E}"/>
+                  </a:ext>
+                </a:extLst>
+              </p:cNvPr>
+              <p:cNvSpPr txBox="1"/>
+              <p:nvPr/>
+            </p:nvSpPr>
+            <p:spPr>
+              <a:xfrm>
+                <a:off x="6478700" y="29156362"/>
+                <a:ext cx="415887" cy="415766"/>
+              </a:xfrm>
+              <a:prstGeom prst="rect">
+                <a:avLst/>
+              </a:prstGeom>
+              <a:noFill/>
+            </p:spPr>
+            <p:txBody>
+              <a:bodyPr wrap="square" rtlCol="0">
+                <a:spAutoFit/>
+              </a:bodyPr>
+              <a:lstStyle/>
+              <a:p>
+                <a:r>
+                  <a:rPr lang="en-US" sz="2000" dirty="0">
+                    <a:solidFill>
+                      <a:schemeClr val="bg1"/>
+                    </a:solidFill>
+                    <a:latin typeface="Arial" panose="020B0604020202020204" pitchFamily="34" charset="0"/>
+                    <a:cs typeface="Arial" panose="020B0604020202020204" pitchFamily="34" charset="0"/>
+                  </a:rPr>
+                  <a:t>7</a:t>
+                </a:r>
+              </a:p>
+            </p:txBody>
+          </p:sp>
+          <p:cxnSp>
+            <p:nvCxnSpPr>
+              <p:cNvPr id="12" name="Straight Arrow Connector 11">
+                <a:extLst>
+                  <a:ext uri="{FF2B5EF4-FFF2-40B4-BE49-F238E27FC236}">
+                    <a16:creationId xmlns:a16="http://schemas.microsoft.com/office/drawing/2014/main" id="{6DED7F98-1204-954E-B084-A1C724AA4C5E}"/>
+                  </a:ext>
+                </a:extLst>
+              </p:cNvPr>
+              <p:cNvCxnSpPr>
+                <a:cxnSpLocks/>
+              </p:cNvCxnSpPr>
+              <p:nvPr/>
+            </p:nvCxnSpPr>
+            <p:spPr>
+              <a:xfrm flipH="1">
+                <a:off x="5265054" y="29154509"/>
+                <a:ext cx="151569" cy="140891"/>
+              </a:xfrm>
+              <a:prstGeom prst="straightConnector1">
+                <a:avLst/>
+              </a:prstGeom>
+              <a:ln>
+                <a:tailEnd type="triangle"/>
+              </a:ln>
+            </p:spPr>
+            <p:style>
+              <a:lnRef idx="1">
+                <a:schemeClr val="dk1"/>
+              </a:lnRef>
+              <a:fillRef idx="0">
+                <a:schemeClr val="dk1"/>
+              </a:fillRef>
+              <a:effectRef idx="0">
+                <a:schemeClr val="dk1"/>
+              </a:effectRef>
+              <a:fontRef idx="minor">
+                <a:schemeClr val="tx1"/>
+              </a:fontRef>
+            </p:style>
+          </p:cxnSp>
+        </p:grpSp>
+        <p:pic>
+          <p:nvPicPr>
+            <p:cNvPr id="5" name="Picture 4">
+              <a:extLst>
+                <a:ext uri="{FF2B5EF4-FFF2-40B4-BE49-F238E27FC236}">
+                  <a16:creationId xmlns:a16="http://schemas.microsoft.com/office/drawing/2014/main" id="{403B1BED-3B4B-814E-B47C-D701CBBD46ED}"/>
+                </a:ext>
+              </a:extLst>
+            </p:cNvPr>
+            <p:cNvPicPr>
+              <a:picLocks noChangeAspect="1"/>
+            </p:cNvPicPr>
+            <p:nvPr/>
+          </p:nvPicPr>
+          <p:blipFill rotWithShape="1">
+            <a:blip r:embed="rId4"/>
+            <a:srcRect l="76320" t="10544" r="6107" b="10476"/>
+            <a:stretch/>
+          </p:blipFill>
+          <p:spPr>
+            <a:xfrm>
+              <a:off x="11613273" y="27579861"/>
+              <a:ext cx="1245710" cy="4199088"/>
+            </a:xfrm>
+            <a:prstGeom prst="rect">
+              <a:avLst/>
+            </a:prstGeom>
+          </p:spPr>
+        </p:pic>
+      </p:grpSp>
+      <p:sp>
+        <p:nvSpPr>
           <p:cNvPr id="57" name="TextBox 56">
             <a:extLst>
               <a:ext uri="{FF2B5EF4-FFF2-40B4-BE49-F238E27FC236}">
@@ -6401,6 +7220,19 @@
               </a:rPr>
               <a:t>5. Distribution of b-values</a:t>
             </a:r>
+          </a:p>
+          <a:p>
+            <a:pPr marL="457200" indent="-457200">
+              <a:buFont typeface="Arial" panose="020B0604020202020204" pitchFamily="34" charset="0"/>
+              <a:buChar char="•"/>
+            </a:pPr>
+            <a:endParaRPr lang="en-US" sz="2800" dirty="0">
+              <a:solidFill>
+                <a:schemeClr val="bg1"/>
+              </a:solidFill>
+              <a:latin typeface="Arial" panose="020B0604020202020204" pitchFamily="34" charset="0"/>
+              <a:cs typeface="Arial" panose="020B0604020202020204" pitchFamily="34" charset="0"/>
+            </a:endParaRPr>
           </a:p>
           <a:p>
             <a:pPr marL="457200" indent="-457200">
@@ -6500,7 +7332,7 @@
           <a:lstStyle/>
           <a:p>
             <a:pPr algn="ctr"/>
-            <a:endParaRPr lang="en-US"/>
+            <a:endParaRPr lang="en-US" dirty="0"/>
           </a:p>
         </p:txBody>
       </p:sp>
@@ -6541,27 +7373,7 @@
                 <a:latin typeface="Times New Roman" panose="02020603050405020304" pitchFamily="18" charset="0"/>
                 <a:cs typeface="Times New Roman" panose="02020603050405020304" pitchFamily="18" charset="0"/>
               </a:rPr>
-              <a:t>The Effects of the Galactic Center on the Ionization of the </a:t>
-            </a:r>
-            <a:r>
-              <a:rPr lang="en-US" dirty="0" err="1">
-                <a:solidFill>
-                  <a:srgbClr val="00B0F0"/>
-                </a:solidFill>
-                <a:latin typeface="Times New Roman" panose="02020603050405020304" pitchFamily="18" charset="0"/>
-                <a:cs typeface="Times New Roman" panose="02020603050405020304" pitchFamily="18" charset="0"/>
-              </a:rPr>
-              <a:t>Magellanic</a:t>
-            </a:r>
-            <a:r>
-              <a:rPr lang="en-US" dirty="0">
-                <a:solidFill>
-                  <a:srgbClr val="00B0F0"/>
-                </a:solidFill>
-                <a:latin typeface="Times New Roman" panose="02020603050405020304" pitchFamily="18" charset="0"/>
-                <a:cs typeface="Times New Roman" panose="02020603050405020304" pitchFamily="18" charset="0"/>
-              </a:rPr>
-              <a:t> Stream</a:t>
+              <a:t>The Effects of the Galactic Center on the Ionization of the Magellanic Stream</a:t>
             </a:r>
           </a:p>
           <a:p>
@@ -6683,14 +7495,14 @@
           <p:nvPr/>
         </p:nvPicPr>
         <p:blipFill rotWithShape="1">
-          <a:blip r:embed="rId3"/>
+          <a:blip r:embed="rId5"/>
           <a:srcRect l="12511" t="22059" r="13144" b="13264"/>
           <a:stretch/>
         </p:blipFill>
         <p:spPr>
           <a:xfrm>
-            <a:off x="2049517" y="1203412"/>
-            <a:ext cx="3626070" cy="1861188"/>
+            <a:off x="1054341" y="1019950"/>
+            <a:ext cx="4516553" cy="2318255"/>
           </a:xfrm>
           <a:prstGeom prst="rect">
             <a:avLst/>
@@ -6757,27 +7569,7 @@
                 <a:latin typeface="Arial" panose="020B0604020202020204" pitchFamily="34" charset="0"/>
                 <a:cs typeface="Arial" panose="020B0604020202020204" pitchFamily="34" charset="0"/>
               </a:rPr>
-              <a:t>The </a:t>
-            </a:r>
-            <a:r>
-              <a:rPr lang="en-US" sz="2800" dirty="0" err="1">
-                <a:solidFill>
-                  <a:schemeClr val="bg1"/>
-                </a:solidFill>
-                <a:latin typeface="Arial" panose="020B0604020202020204" pitchFamily="34" charset="0"/>
-                <a:cs typeface="Arial" panose="020B0604020202020204" pitchFamily="34" charset="0"/>
-              </a:rPr>
-              <a:t>Magellanic</a:t>
-            </a:r>
-            <a:r>
-              <a:rPr lang="en-US" sz="2800" dirty="0">
-                <a:solidFill>
-                  <a:schemeClr val="bg1"/>
-                </a:solidFill>
-                <a:latin typeface="Arial" panose="020B0604020202020204" pitchFamily="34" charset="0"/>
-                <a:cs typeface="Arial" panose="020B0604020202020204" pitchFamily="34" charset="0"/>
-              </a:rPr>
-              <a:t> System around our Milky Way (MW) galaxy consists of:</a:t>
+              <a:t>The Magellanic System around our Milky Way (MW) galaxy consists of:</a:t>
             </a:r>
           </a:p>
           <a:p>
@@ -6803,27 +7595,7 @@
                 <a:latin typeface="Arial" panose="020B0604020202020204" pitchFamily="34" charset="0"/>
                 <a:cs typeface="Arial" panose="020B0604020202020204" pitchFamily="34" charset="0"/>
               </a:rPr>
-              <a:t>Large and Small </a:t>
-            </a:r>
-            <a:r>
-              <a:rPr lang="en-US" sz="2800" b="1" dirty="0" err="1">
-                <a:solidFill>
-                  <a:schemeClr val="bg1"/>
-                </a:solidFill>
-                <a:latin typeface="Arial" panose="020B0604020202020204" pitchFamily="34" charset="0"/>
-                <a:cs typeface="Arial" panose="020B0604020202020204" pitchFamily="34" charset="0"/>
-              </a:rPr>
-              <a:t>Magellanic</a:t>
-            </a:r>
-            <a:r>
-              <a:rPr lang="en-US" sz="2800" b="1" dirty="0">
-                <a:solidFill>
-                  <a:schemeClr val="bg1"/>
-                </a:solidFill>
-                <a:latin typeface="Arial" panose="020B0604020202020204" pitchFamily="34" charset="0"/>
-                <a:cs typeface="Arial" panose="020B0604020202020204" pitchFamily="34" charset="0"/>
-              </a:rPr>
-              <a:t> Clouds </a:t>
+              <a:t>Large and Small Magellanic Clouds </a:t>
             </a:r>
             <a:r>
               <a:rPr lang="en-US" sz="2800" dirty="0">
@@ -6852,24 +7624,14 @@
               <a:t>the </a:t>
             </a:r>
             <a:r>
-              <a:rPr lang="en-US" sz="2800" b="1" dirty="0" err="1">
+              <a:rPr lang="en-US" sz="2800" b="1" dirty="0">
                 <a:solidFill>
                   <a:schemeClr val="bg1"/>
                 </a:solidFill>
                 <a:latin typeface="Arial" panose="020B0604020202020204" pitchFamily="34" charset="0"/>
                 <a:cs typeface="Arial" panose="020B0604020202020204" pitchFamily="34" charset="0"/>
               </a:rPr>
-              <a:t>Magellanic</a:t>
-            </a:r>
-            <a:r>
-              <a:rPr lang="en-US" sz="2800" b="1" dirty="0">
-                <a:solidFill>
-                  <a:schemeClr val="bg1"/>
-                </a:solidFill>
-                <a:latin typeface="Arial" panose="020B0604020202020204" pitchFamily="34" charset="0"/>
-                <a:cs typeface="Arial" panose="020B0604020202020204" pitchFamily="34" charset="0"/>
-              </a:rPr>
-              <a:t> Stream </a:t>
+              <a:t>Magellanic Stream </a:t>
             </a:r>
             <a:r>
               <a:rPr lang="en-US" sz="2800" dirty="0">
@@ -7225,7 +7987,7 @@
         </p:nvSpPr>
         <p:spPr>
           <a:xfrm>
-            <a:off x="800100" y="18664047"/>
+            <a:off x="800100" y="18660237"/>
             <a:ext cx="12344400" cy="5528241"/>
           </a:xfrm>
           <a:prstGeom prst="rect">
@@ -7284,7 +8046,7 @@
               <a:t>We use the Python package </a:t>
             </a:r>
             <a:r>
-              <a:rPr lang="en-US" sz="2800" dirty="0" err="1">
+              <a:rPr lang="en-US" sz="2800" dirty="0">
                 <a:solidFill>
                   <a:schemeClr val="bg1"/>
                 </a:solidFill>
@@ -7301,27 +8063,7 @@
                 <a:latin typeface="Arial" panose="020B0604020202020204" pitchFamily="34" charset="0"/>
                 <a:cs typeface="Arial" panose="020B0604020202020204" pitchFamily="34" charset="0"/>
               </a:rPr>
-              <a:t> (</a:t>
-            </a:r>
-            <a:r>
-              <a:rPr lang="en-US" sz="2800" dirty="0" err="1">
-                <a:solidFill>
-                  <a:schemeClr val="bg1"/>
-                </a:solidFill>
-                <a:latin typeface="Arial" panose="020B0604020202020204" pitchFamily="34" charset="0"/>
-                <a:cs typeface="Arial" panose="020B0604020202020204" pitchFamily="34" charset="0"/>
-              </a:rPr>
-              <a:t>Krogager</a:t>
-            </a:r>
-            <a:r>
-              <a:rPr lang="en-US" sz="2800" dirty="0">
-                <a:solidFill>
-                  <a:schemeClr val="bg1"/>
-                </a:solidFill>
-                <a:latin typeface="Arial" panose="020B0604020202020204" pitchFamily="34" charset="0"/>
-                <a:cs typeface="Arial" panose="020B0604020202020204" pitchFamily="34" charset="0"/>
-              </a:rPr>
-              <a:t> 2018) to fit multi-component Voigt profiles to low and high ions for each sightline. We attempt to fit O I, C II, S II, Si II, Si III, Si IV, and C IV.</a:t>
+              <a:t> (Krogager 2018) to fit multi-component Voigt profiles to low and high ions for each sightline. We attempt to fit O I, C II, S II, Si II, Si III, Si IV, and C IV.</a:t>
             </a:r>
           </a:p>
           <a:p>
@@ -7340,7 +8082,7 @@
               <a:t>The </a:t>
             </a:r>
             <a:r>
-              <a:rPr lang="en-US" sz="2800" dirty="0" err="1">
+              <a:rPr lang="en-US" sz="2800" dirty="0">
                 <a:solidFill>
                   <a:schemeClr val="bg1"/>
                 </a:solidFill>
@@ -7360,7 +8102,7 @@
               <a:t> module includes tasks to fit the continuum and mask unnecessary features while performing each fit. The outputs include a redshift, b-value (line width), and column density for each component fit. We compared the outputs of </a:t>
             </a:r>
             <a:r>
-              <a:rPr lang="en-US" sz="2800" dirty="0" err="1">
+              <a:rPr lang="en-US" sz="2800" dirty="0">
                 <a:solidFill>
                   <a:schemeClr val="bg1"/>
                 </a:solidFill>
@@ -7405,170 +8147,6 @@
               </a:solidFill>
               <a:latin typeface="Arial" panose="020B0604020202020204" pitchFamily="34" charset="0"/>
               <a:cs typeface="Arial" panose="020B0604020202020204" pitchFamily="34" charset="0"/>
-            </a:endParaRPr>
-          </a:p>
-        </p:txBody>
-      </p:sp>
-      <p:sp>
-        <p:nvSpPr>
-          <p:cNvPr id="44" name="TextBox 43">
-            <a:extLst>
-              <a:ext uri="{FF2B5EF4-FFF2-40B4-BE49-F238E27FC236}">
-                <a16:creationId xmlns:a16="http://schemas.microsoft.com/office/drawing/2014/main" id="{632C9929-8F16-114B-9508-A28BFFF9591D}"/>
-              </a:ext>
-            </a:extLst>
-          </p:cNvPr>
-          <p:cNvSpPr txBox="1"/>
-          <p:nvPr/>
-        </p:nvSpPr>
-        <p:spPr>
-          <a:xfrm>
-            <a:off x="800100" y="24953346"/>
-            <a:ext cx="12344400" cy="7281360"/>
-          </a:xfrm>
-          <a:prstGeom prst="rect">
-            <a:avLst/>
-          </a:prstGeom>
-          <a:solidFill>
-            <a:schemeClr val="tx1"/>
-          </a:solidFill>
-        </p:spPr>
-        <p:txBody>
-          <a:bodyPr wrap="square" lIns="182880" tIns="182880" rIns="182880" bIns="182880" rtlCol="0">
-            <a:noAutofit/>
-          </a:bodyPr>
-          <a:lstStyle/>
-          <a:p>
-            <a:r>
-              <a:rPr lang="en-US" sz="3600" dirty="0">
-                <a:solidFill>
-                  <a:srgbClr val="00B0F0"/>
-                </a:solidFill>
-                <a:latin typeface="Times New Roman" panose="02020603050405020304" pitchFamily="18" charset="0"/>
-                <a:cs typeface="Times New Roman" panose="02020603050405020304" pitchFamily="18" charset="0"/>
-              </a:rPr>
-              <a:t>3. Effect of the GC on the </a:t>
-            </a:r>
-            <a:r>
-              <a:rPr lang="en-US" sz="3600" dirty="0" err="1">
-                <a:solidFill>
-                  <a:srgbClr val="00B0F0"/>
-                </a:solidFill>
-                <a:latin typeface="Times New Roman" panose="02020603050405020304" pitchFamily="18" charset="0"/>
-                <a:cs typeface="Times New Roman" panose="02020603050405020304" pitchFamily="18" charset="0"/>
-              </a:rPr>
-              <a:t>Magellanic</a:t>
-            </a:r>
-            <a:r>
-              <a:rPr lang="en-US" sz="3600" dirty="0">
-                <a:solidFill>
-                  <a:srgbClr val="00B0F0"/>
-                </a:solidFill>
-                <a:latin typeface="Times New Roman" panose="02020603050405020304" pitchFamily="18" charset="0"/>
-                <a:cs typeface="Times New Roman" panose="02020603050405020304" pitchFamily="18" charset="0"/>
-              </a:rPr>
-              <a:t> Stream</a:t>
-            </a:r>
-          </a:p>
-          <a:p>
-            <a:endParaRPr lang="en-US" sz="2800" dirty="0">
-              <a:solidFill>
-                <a:schemeClr val="bg1"/>
-              </a:solidFill>
-              <a:latin typeface="Arial" panose="020B0604020202020204" pitchFamily="34" charset="0"/>
-              <a:cs typeface="Arial" panose="020B0604020202020204" pitchFamily="34" charset="0"/>
-            </a:endParaRPr>
-          </a:p>
-          <a:p>
-            <a:endParaRPr lang="en-US" sz="2800" dirty="0">
-              <a:solidFill>
-                <a:schemeClr val="bg1"/>
-              </a:solidFill>
-              <a:latin typeface="Arial" panose="020B0604020202020204" pitchFamily="34" charset="0"/>
-              <a:cs typeface="Arial" panose="020B0604020202020204" pitchFamily="34" charset="0"/>
-            </a:endParaRPr>
-          </a:p>
-          <a:p>
-            <a:endParaRPr lang="en-US" sz="2800" dirty="0">
-              <a:solidFill>
-                <a:schemeClr val="bg1"/>
-              </a:solidFill>
-              <a:latin typeface="Arial" panose="020B0604020202020204" pitchFamily="34" charset="0"/>
-              <a:cs typeface="Arial" panose="020B0604020202020204" pitchFamily="34" charset="0"/>
-            </a:endParaRPr>
-          </a:p>
-          <a:p>
-            <a:endParaRPr lang="en-US" sz="2800" dirty="0">
-              <a:solidFill>
-                <a:schemeClr val="bg1"/>
-              </a:solidFill>
-              <a:latin typeface="Arial" panose="020B0604020202020204" pitchFamily="34" charset="0"/>
-              <a:cs typeface="Arial" panose="020B0604020202020204" pitchFamily="34" charset="0"/>
-            </a:endParaRPr>
-          </a:p>
-          <a:p>
-            <a:endParaRPr lang="en-US" sz="2800" dirty="0">
-              <a:solidFill>
-                <a:schemeClr val="bg1"/>
-              </a:solidFill>
-              <a:latin typeface="Arial" panose="020B0604020202020204" pitchFamily="34" charset="0"/>
-              <a:cs typeface="Arial" panose="020B0604020202020204" pitchFamily="34" charset="0"/>
-            </a:endParaRPr>
-          </a:p>
-          <a:p>
-            <a:endParaRPr lang="en-US" sz="3600" dirty="0">
-              <a:solidFill>
-                <a:srgbClr val="00B0F0"/>
-              </a:solidFill>
-            </a:endParaRPr>
-          </a:p>
-          <a:p>
-            <a:endParaRPr lang="en-US" sz="3600" dirty="0">
-              <a:solidFill>
-                <a:srgbClr val="00B0F0"/>
-              </a:solidFill>
-            </a:endParaRPr>
-          </a:p>
-          <a:p>
-            <a:endParaRPr lang="en-US" sz="3600" dirty="0">
-              <a:solidFill>
-                <a:srgbClr val="00B0F0"/>
-              </a:solidFill>
-            </a:endParaRPr>
-          </a:p>
-          <a:p>
-            <a:endParaRPr lang="en-US" sz="3600" dirty="0">
-              <a:solidFill>
-                <a:srgbClr val="00B0F0"/>
-              </a:solidFill>
-            </a:endParaRPr>
-          </a:p>
-          <a:p>
-            <a:endParaRPr lang="en-US" sz="3600" dirty="0">
-              <a:solidFill>
-                <a:srgbClr val="00B0F0"/>
-              </a:solidFill>
-            </a:endParaRPr>
-          </a:p>
-          <a:p>
-            <a:endParaRPr lang="en-US" sz="3600" dirty="0">
-              <a:solidFill>
-                <a:srgbClr val="00B0F0"/>
-              </a:solidFill>
-            </a:endParaRPr>
-          </a:p>
-          <a:p>
-            <a:endParaRPr lang="en-US" sz="3600" dirty="0">
-              <a:solidFill>
-                <a:srgbClr val="00B0F0"/>
-              </a:solidFill>
-            </a:endParaRPr>
-          </a:p>
-          <a:p>
-            <a:endParaRPr lang="en-US" sz="3600" dirty="0">
-              <a:solidFill>
-                <a:srgbClr val="00B0F0"/>
-              </a:solidFill>
             </a:endParaRPr>
           </a:p>
         </p:txBody>
@@ -7746,27 +8324,7 @@
                 <a:latin typeface="Arial" panose="020B0604020202020204" pitchFamily="34" charset="0"/>
                 <a:cs typeface="Arial" panose="020B0604020202020204" pitchFamily="34" charset="0"/>
               </a:rPr>
-              <a:t>Bland-Hawthorn, J., Maloney, P. R., et al. 2003, </a:t>
-            </a:r>
-            <a:r>
-              <a:rPr lang="en-US" sz="2400" dirty="0" err="1">
-                <a:solidFill>
-                  <a:schemeClr val="bg1"/>
-                </a:solidFill>
-                <a:latin typeface="Arial" panose="020B0604020202020204" pitchFamily="34" charset="0"/>
-                <a:cs typeface="Arial" panose="020B0604020202020204" pitchFamily="34" charset="0"/>
-              </a:rPr>
-              <a:t>ApJ</a:t>
-            </a:r>
-            <a:r>
-              <a:rPr lang="en-US" sz="2400" dirty="0">
-                <a:solidFill>
-                  <a:schemeClr val="bg1"/>
-                </a:solidFill>
-                <a:latin typeface="Arial" panose="020B0604020202020204" pitchFamily="34" charset="0"/>
-                <a:cs typeface="Arial" panose="020B0604020202020204" pitchFamily="34" charset="0"/>
-              </a:rPr>
-              <a:t>, 778, 1</a:t>
+              <a:t>Bland-Hawthorn, J., Maloney, P. R., et al. 2003, ApJ, 778, 1</a:t>
             </a:r>
           </a:p>
           <a:p>
@@ -7795,15 +8353,17 @@
           </a:p>
           <a:p>
             <a:r>
-              <a:rPr lang="en-US" sz="2400" dirty="0" err="1">
+              <a:rPr lang="en-US" sz="2400" dirty="0">
                 <a:solidFill>
                   <a:schemeClr val="bg1"/>
                 </a:solidFill>
                 <a:latin typeface="Arial" panose="020B0604020202020204" pitchFamily="34" charset="0"/>
                 <a:cs typeface="Arial" panose="020B0604020202020204" pitchFamily="34" charset="0"/>
               </a:rPr>
-              <a:t>D’Onghia</a:t>
-            </a:r>
+              <a:t>D’Onghia, E. &amp; Fox, A. J., 2016, ARA&amp;A, 54, 363</a:t>
+            </a:r>
+          </a:p>
+          <a:p>
             <a:r>
               <a:rPr lang="en-US" sz="2400" dirty="0">
                 <a:solidFill>
@@ -7812,7 +8372,7 @@
                 <a:latin typeface="Arial" panose="020B0604020202020204" pitchFamily="34" charset="0"/>
                 <a:cs typeface="Arial" panose="020B0604020202020204" pitchFamily="34" charset="0"/>
               </a:rPr>
-              <a:t>, E. &amp; Fox, A. J., 2016, ARA&amp;A, 54, 363</a:t>
+              <a:t>Fox, A. J., Wakker, B. P., Barger, K. A., et al. 2014, ApJ, 787, 147</a:t>
             </a:r>
           </a:p>
           <a:p>
@@ -7824,18 +8384,22 @@
                 <a:latin typeface="Arial" panose="020B0604020202020204" pitchFamily="34" charset="0"/>
                 <a:cs typeface="Arial" panose="020B0604020202020204" pitchFamily="34" charset="0"/>
               </a:rPr>
-              <a:t>Fox, A. J., </a:t>
-            </a:r>
-            <a:r>
-              <a:rPr lang="en-US" sz="2400" dirty="0" err="1">
+              <a:t>Fox, A. J., Barger, K. A., Wakker, B. P., et al. 2018, ApJ, 854, 142</a:t>
+            </a:r>
+          </a:p>
+          <a:p>
+            <a:r>
+              <a:rPr lang="en-US" sz="2400" dirty="0">
                 <a:solidFill>
                   <a:schemeClr val="bg1"/>
                 </a:solidFill>
                 <a:latin typeface="Arial" panose="020B0604020202020204" pitchFamily="34" charset="0"/>
                 <a:cs typeface="Arial" panose="020B0604020202020204" pitchFamily="34" charset="0"/>
               </a:rPr>
-              <a:t>Wakker</a:t>
-            </a:r>
+              <a:t>Krogager, J. K., 2018, VoigtFit, https://arxiv.org/abs/1803.01187</a:t>
+            </a:r>
+          </a:p>
+          <a:p>
             <a:r>
               <a:rPr lang="en-US" sz="2400" dirty="0">
                 <a:solidFill>
@@ -7844,163 +8408,7 @@
                 <a:latin typeface="Arial" panose="020B0604020202020204" pitchFamily="34" charset="0"/>
                 <a:cs typeface="Arial" panose="020B0604020202020204" pitchFamily="34" charset="0"/>
               </a:rPr>
-              <a:t>, B. P., Barger, K. A., et al. 2014, </a:t>
-            </a:r>
-            <a:r>
-              <a:rPr lang="en-US" sz="2400" dirty="0" err="1">
-                <a:solidFill>
-                  <a:schemeClr val="bg1"/>
-                </a:solidFill>
-                <a:latin typeface="Arial" panose="020B0604020202020204" pitchFamily="34" charset="0"/>
-                <a:cs typeface="Arial" panose="020B0604020202020204" pitchFamily="34" charset="0"/>
-              </a:rPr>
-              <a:t>ApJ</a:t>
-            </a:r>
-            <a:r>
-              <a:rPr lang="en-US" sz="2400" dirty="0">
-                <a:solidFill>
-                  <a:schemeClr val="bg1"/>
-                </a:solidFill>
-                <a:latin typeface="Arial" panose="020B0604020202020204" pitchFamily="34" charset="0"/>
-                <a:cs typeface="Arial" panose="020B0604020202020204" pitchFamily="34" charset="0"/>
-              </a:rPr>
-              <a:t>, 787, 147</a:t>
-            </a:r>
-          </a:p>
-          <a:p>
-            <a:r>
-              <a:rPr lang="en-US" sz="2400" dirty="0">
-                <a:solidFill>
-                  <a:schemeClr val="bg1"/>
-                </a:solidFill>
-                <a:latin typeface="Arial" panose="020B0604020202020204" pitchFamily="34" charset="0"/>
-                <a:cs typeface="Arial" panose="020B0604020202020204" pitchFamily="34" charset="0"/>
-              </a:rPr>
-              <a:t>Fox, A. J., Barger, K. A., </a:t>
-            </a:r>
-            <a:r>
-              <a:rPr lang="en-US" sz="2400" dirty="0" err="1">
-                <a:solidFill>
-                  <a:schemeClr val="bg1"/>
-                </a:solidFill>
-                <a:latin typeface="Arial" panose="020B0604020202020204" pitchFamily="34" charset="0"/>
-                <a:cs typeface="Arial" panose="020B0604020202020204" pitchFamily="34" charset="0"/>
-              </a:rPr>
-              <a:t>Wakker</a:t>
-            </a:r>
-            <a:r>
-              <a:rPr lang="en-US" sz="2400" dirty="0">
-                <a:solidFill>
-                  <a:schemeClr val="bg1"/>
-                </a:solidFill>
-                <a:latin typeface="Arial" panose="020B0604020202020204" pitchFamily="34" charset="0"/>
-                <a:cs typeface="Arial" panose="020B0604020202020204" pitchFamily="34" charset="0"/>
-              </a:rPr>
-              <a:t>, B. P., et al. 2018, </a:t>
-            </a:r>
-            <a:r>
-              <a:rPr lang="en-US" sz="2400" dirty="0" err="1">
-                <a:solidFill>
-                  <a:schemeClr val="bg1"/>
-                </a:solidFill>
-                <a:latin typeface="Arial" panose="020B0604020202020204" pitchFamily="34" charset="0"/>
-                <a:cs typeface="Arial" panose="020B0604020202020204" pitchFamily="34" charset="0"/>
-              </a:rPr>
-              <a:t>ApJ</a:t>
-            </a:r>
-            <a:r>
-              <a:rPr lang="en-US" sz="2400" dirty="0">
-                <a:solidFill>
-                  <a:schemeClr val="bg1"/>
-                </a:solidFill>
-                <a:latin typeface="Arial" panose="020B0604020202020204" pitchFamily="34" charset="0"/>
-                <a:cs typeface="Arial" panose="020B0604020202020204" pitchFamily="34" charset="0"/>
-              </a:rPr>
-              <a:t>, 854, 142</a:t>
-            </a:r>
-          </a:p>
-          <a:p>
-            <a:r>
-              <a:rPr lang="en-US" sz="2400" dirty="0" err="1">
-                <a:solidFill>
-                  <a:schemeClr val="bg1"/>
-                </a:solidFill>
-                <a:latin typeface="Arial" panose="020B0604020202020204" pitchFamily="34" charset="0"/>
-                <a:cs typeface="Arial" panose="020B0604020202020204" pitchFamily="34" charset="0"/>
-              </a:rPr>
-              <a:t>Krogager</a:t>
-            </a:r>
-            <a:r>
-              <a:rPr lang="en-US" sz="2400" dirty="0">
-                <a:solidFill>
-                  <a:schemeClr val="bg1"/>
-                </a:solidFill>
-                <a:latin typeface="Arial" panose="020B0604020202020204" pitchFamily="34" charset="0"/>
-                <a:cs typeface="Arial" panose="020B0604020202020204" pitchFamily="34" charset="0"/>
-              </a:rPr>
-              <a:t>, J. K., 2018, </a:t>
-            </a:r>
-            <a:r>
-              <a:rPr lang="en-US" sz="2400" dirty="0" err="1">
-                <a:solidFill>
-                  <a:schemeClr val="bg1"/>
-                </a:solidFill>
-                <a:latin typeface="Arial" panose="020B0604020202020204" pitchFamily="34" charset="0"/>
-                <a:cs typeface="Arial" panose="020B0604020202020204" pitchFamily="34" charset="0"/>
-              </a:rPr>
-              <a:t>VoigtFit</a:t>
-            </a:r>
-            <a:r>
-              <a:rPr lang="en-US" sz="2400" dirty="0">
-                <a:solidFill>
-                  <a:schemeClr val="bg1"/>
-                </a:solidFill>
-                <a:latin typeface="Arial" panose="020B0604020202020204" pitchFamily="34" charset="0"/>
-                <a:cs typeface="Arial" panose="020B0604020202020204" pitchFamily="34" charset="0"/>
-              </a:rPr>
-              <a:t>, https://arxiv.org/abs/1803.01187</a:t>
-            </a:r>
-          </a:p>
-          <a:p>
-            <a:r>
-              <a:rPr lang="en-US" sz="2400" dirty="0" err="1">
-                <a:solidFill>
-                  <a:schemeClr val="bg1"/>
-                </a:solidFill>
-                <a:latin typeface="Arial" panose="020B0604020202020204" pitchFamily="34" charset="0"/>
-                <a:cs typeface="Arial" panose="020B0604020202020204" pitchFamily="34" charset="0"/>
-              </a:rPr>
-              <a:t>Nidever</a:t>
-            </a:r>
-            <a:r>
-              <a:rPr lang="en-US" sz="2400" dirty="0">
-                <a:solidFill>
-                  <a:schemeClr val="bg1"/>
-                </a:solidFill>
-                <a:latin typeface="Arial" panose="020B0604020202020204" pitchFamily="34" charset="0"/>
-                <a:cs typeface="Arial" panose="020B0604020202020204" pitchFamily="34" charset="0"/>
-              </a:rPr>
-              <a:t>, D. L., Majewski, S. R., &amp; Burton, W. B. 2010, </a:t>
-            </a:r>
-            <a:r>
-              <a:rPr lang="en-US" sz="2400" dirty="0" err="1">
-                <a:solidFill>
-                  <a:schemeClr val="bg1"/>
-                </a:solidFill>
-                <a:latin typeface="Arial" panose="020B0604020202020204" pitchFamily="34" charset="0"/>
-                <a:cs typeface="Arial" panose="020B0604020202020204" pitchFamily="34" charset="0"/>
-              </a:rPr>
-              <a:t>ApJ</a:t>
-            </a:r>
-            <a:r>
-              <a:rPr lang="en-US" sz="2400" dirty="0">
-                <a:solidFill>
-                  <a:schemeClr val="bg1"/>
-                </a:solidFill>
-                <a:latin typeface="Arial" panose="020B0604020202020204" pitchFamily="34" charset="0"/>
-                <a:cs typeface="Arial" panose="020B0604020202020204" pitchFamily="34" charset="0"/>
-              </a:rPr>
-              <a:t>, 723, 1618 </a:t>
+              <a:t>Nidever, D. L., Majewski, S. R., &amp; Burton, W. B. 2010, ApJ, 723, 1618 </a:t>
             </a:r>
           </a:p>
         </p:txBody>
@@ -8051,47 +8459,7 @@
                 <a:latin typeface="Arial" panose="020B0604020202020204" pitchFamily="34" charset="0"/>
                 <a:cs typeface="Arial" panose="020B0604020202020204" pitchFamily="34" charset="0"/>
               </a:rPr>
-              <a:t>: H I observations of the </a:t>
-            </a:r>
-            <a:r>
-              <a:rPr lang="en-US" sz="2200" dirty="0" err="1">
-                <a:solidFill>
-                  <a:schemeClr val="bg1"/>
-                </a:solidFill>
-                <a:latin typeface="Arial" panose="020B0604020202020204" pitchFamily="34" charset="0"/>
-                <a:cs typeface="Arial" panose="020B0604020202020204" pitchFamily="34" charset="0"/>
-              </a:rPr>
-              <a:t>Magellanic</a:t>
-            </a:r>
-            <a:r>
-              <a:rPr lang="en-US" sz="2200" dirty="0">
-                <a:solidFill>
-                  <a:schemeClr val="bg1"/>
-                </a:solidFill>
-                <a:latin typeface="Arial" panose="020B0604020202020204" pitchFamily="34" charset="0"/>
-                <a:cs typeface="Arial" panose="020B0604020202020204" pitchFamily="34" charset="0"/>
-              </a:rPr>
-              <a:t> System in Galactic coordinates, shown in pink (</a:t>
-            </a:r>
-            <a:r>
-              <a:rPr lang="en-US" sz="2200" dirty="0" err="1">
-                <a:solidFill>
-                  <a:schemeClr val="bg1"/>
-                </a:solidFill>
-                <a:latin typeface="Arial" panose="020B0604020202020204" pitchFamily="34" charset="0"/>
-                <a:cs typeface="Arial" panose="020B0604020202020204" pitchFamily="34" charset="0"/>
-              </a:rPr>
-              <a:t>Nidever</a:t>
-            </a:r>
-            <a:r>
-              <a:rPr lang="en-US" sz="2200" dirty="0">
-                <a:solidFill>
-                  <a:schemeClr val="bg1"/>
-                </a:solidFill>
-                <a:latin typeface="Arial" panose="020B0604020202020204" pitchFamily="34" charset="0"/>
-                <a:cs typeface="Arial" panose="020B0604020202020204" pitchFamily="34" charset="0"/>
-              </a:rPr>
-              <a:t> et al. 2010).</a:t>
+              <a:t>: H I observations of the Magellanic System in Galactic coordinates, shown in pink (Nidever et al. 2010).</a:t>
             </a:r>
           </a:p>
         </p:txBody>
@@ -8131,7 +8499,7 @@
             <p:nvPr/>
           </p:nvPicPr>
           <p:blipFill>
-            <a:blip r:embed="rId4"/>
+            <a:blip r:embed="rId6"/>
             <a:stretch>
               <a:fillRect/>
             </a:stretch>
@@ -8213,18 +8581,11 @@
             <a:lstStyle/>
             <a:p>
               <a:r>
-                <a:rPr lang="en-US" sz="1600" dirty="0" err="1">
-                  <a:latin typeface="Arial" panose="020B0604020202020204" pitchFamily="34" charset="0"/>
-                  <a:cs typeface="Arial" panose="020B0604020202020204" pitchFamily="34" charset="0"/>
-                </a:rPr>
-                <a:t>Magellanic</a:t>
-              </a:r>
-              <a:r>
                 <a:rPr lang="en-US" sz="1600" dirty="0">
                   <a:latin typeface="Arial" panose="020B0604020202020204" pitchFamily="34" charset="0"/>
                   <a:cs typeface="Arial" panose="020B0604020202020204" pitchFamily="34" charset="0"/>
                 </a:rPr>
-                <a:t> Stream</a:t>
+                <a:t>Magellanic Stream</a:t>
               </a:r>
             </a:p>
           </p:txBody>
@@ -8385,7 +8746,7 @@
             <a:lstStyle/>
             <a:p>
               <a:pPr algn="ctr"/>
-              <a:endParaRPr lang="en-US"/>
+              <a:endParaRPr lang="en-US" dirty="0"/>
             </a:p>
           </p:txBody>
         </p:sp>
@@ -8405,7 +8766,7 @@
           <p:nvPr/>
         </p:nvPicPr>
         <p:blipFill rotWithShape="1">
-          <a:blip r:embed="rId5"/>
+          <a:blip r:embed="rId7"/>
           <a:srcRect l="5547" t="5308" r="7448"/>
           <a:stretch/>
         </p:blipFill>
@@ -8434,7 +8795,7 @@
           <p:nvPr/>
         </p:nvPicPr>
         <p:blipFill rotWithShape="1">
-          <a:blip r:embed="rId6"/>
+          <a:blip r:embed="rId8"/>
           <a:srcRect l="5769" t="4341" r="7179"/>
           <a:stretch/>
         </p:blipFill>
@@ -8463,7 +8824,7 @@
           <p:nvPr/>
         </p:nvPicPr>
         <p:blipFill rotWithShape="1">
-          <a:blip r:embed="rId7"/>
+          <a:blip r:embed="rId9"/>
           <a:srcRect l="5666" t="5371" r="7812" b="1357"/>
           <a:stretch/>
         </p:blipFill>
@@ -8492,7 +8853,7 @@
           <p:nvPr/>
         </p:nvPicPr>
         <p:blipFill rotWithShape="1">
-          <a:blip r:embed="rId8"/>
+          <a:blip r:embed="rId10"/>
           <a:srcRect l="4577" t="6764" r="6173" b="1"/>
           <a:stretch/>
         </p:blipFill>
@@ -8548,6 +8909,15 @@
             </a:r>
           </a:p>
           <a:p>
+            <a:endParaRPr lang="en-US" sz="2800" dirty="0">
+              <a:solidFill>
+                <a:schemeClr val="bg1"/>
+              </a:solidFill>
+              <a:latin typeface="Arial" panose="020B0604020202020204" pitchFamily="34" charset="0"/>
+              <a:cs typeface="Arial" panose="020B0604020202020204" pitchFamily="34" charset="0"/>
+            </a:endParaRPr>
+          </a:p>
+          <a:p>
             <a:r>
               <a:rPr lang="en-US" sz="2800" dirty="0">
                 <a:solidFill>
@@ -8556,27 +8926,7 @@
                 <a:latin typeface="Arial" panose="020B0604020202020204" pitchFamily="34" charset="0"/>
                 <a:cs typeface="Arial" panose="020B0604020202020204" pitchFamily="34" charset="0"/>
               </a:rPr>
-              <a:t>The alignment of low- and high-ion components in different sightlines could lend evidence for the </a:t>
-            </a:r>
-            <a:r>
-              <a:rPr lang="en-US" sz="2800" dirty="0" err="1">
-                <a:solidFill>
-                  <a:schemeClr val="bg1"/>
-                </a:solidFill>
-                <a:latin typeface="Arial" panose="020B0604020202020204" pitchFamily="34" charset="0"/>
-                <a:cs typeface="Arial" panose="020B0604020202020204" pitchFamily="34" charset="0"/>
-              </a:rPr>
-              <a:t>Seyfert</a:t>
-            </a:r>
-            <a:r>
-              <a:rPr lang="en-US" sz="2800" dirty="0">
-                <a:solidFill>
-                  <a:schemeClr val="bg1"/>
-                </a:solidFill>
-                <a:latin typeface="Arial" panose="020B0604020202020204" pitchFamily="34" charset="0"/>
-                <a:cs typeface="Arial" panose="020B0604020202020204" pitchFamily="34" charset="0"/>
-              </a:rPr>
-              <a:t> model, while mis-alignment could point towards the two-phase model.</a:t>
+              <a:t>The alignment of low- and high-ion components in different sightlines could lend evidence for the Seyfert model, while mis-alignment could point towards the two-phase model.</a:t>
             </a:r>
             <a:endParaRPr lang="en-US" sz="3200" dirty="0">
               <a:solidFill>
@@ -8738,27 +9088,7 @@
                 <a:latin typeface="Arial" panose="020B0604020202020204" pitchFamily="34" charset="0"/>
                 <a:cs typeface="Arial" panose="020B0604020202020204" pitchFamily="34" charset="0"/>
               </a:rPr>
-              <a:t>: The </a:t>
-            </a:r>
-            <a:r>
-              <a:rPr lang="en-US" sz="2800" dirty="0" err="1">
-                <a:solidFill>
-                  <a:schemeClr val="bg1"/>
-                </a:solidFill>
-                <a:latin typeface="Arial" panose="020B0604020202020204" pitchFamily="34" charset="0"/>
-                <a:cs typeface="Arial" panose="020B0604020202020204" pitchFamily="34" charset="0"/>
-              </a:rPr>
-              <a:t>VoigtFit</a:t>
-            </a:r>
-            <a:r>
-              <a:rPr lang="en-US" sz="2800" dirty="0">
-                <a:solidFill>
-                  <a:schemeClr val="bg1"/>
-                </a:solidFill>
-                <a:latin typeface="Arial" panose="020B0604020202020204" pitchFamily="34" charset="0"/>
-                <a:cs typeface="Arial" panose="020B0604020202020204" pitchFamily="34" charset="0"/>
-              </a:rPr>
-              <a:t> component fits to each LA sightline. Each figure shows the spectrum of a low ion and high ion plotted by relative velocity and offset flux, along with their best-fit lines. The dashed lines give the center redshift position of each component. The small number in the corner marks where each sightline lies on the map in box 3.</a:t>
+              <a:t>: The VoigtFit component fits to each LA sightline. Each figure shows the spectrum of a low ion and high ion plotted by relative velocity and offset flux, along with their best-fit lines. The dashed lines give the center redshift position of each component. The small number in the corner marks where each sightline lies on the map in box 3.</a:t>
             </a:r>
           </a:p>
           <a:p>
@@ -8999,15 +9329,6 @@
             </a:endParaRPr>
           </a:p>
           <a:p>
-            <a:endParaRPr lang="en-US" sz="2800" dirty="0">
-              <a:solidFill>
-                <a:srgbClr val="00B0F0"/>
-              </a:solidFill>
-              <a:latin typeface="Arial" panose="020B0604020202020204" pitchFamily="34" charset="0"/>
-              <a:cs typeface="Arial" panose="020B0604020202020204" pitchFamily="34" charset="0"/>
-            </a:endParaRPr>
-          </a:p>
-          <a:p>
             <a:endParaRPr lang="en-US" sz="2800" b="1" dirty="0">
               <a:solidFill>
                 <a:schemeClr val="bg1"/>
@@ -9035,27 +9356,7 @@
                 <a:latin typeface="Arial" panose="020B0604020202020204" pitchFamily="34" charset="0"/>
                 <a:cs typeface="Arial" panose="020B0604020202020204" pitchFamily="34" charset="0"/>
               </a:rPr>
-              <a:t>: The </a:t>
-            </a:r>
-            <a:r>
-              <a:rPr lang="en-US" sz="2800" dirty="0" err="1">
-                <a:solidFill>
-                  <a:schemeClr val="bg1"/>
-                </a:solidFill>
-                <a:latin typeface="Arial" panose="020B0604020202020204" pitchFamily="34" charset="0"/>
-                <a:cs typeface="Arial" panose="020B0604020202020204" pitchFamily="34" charset="0"/>
-              </a:rPr>
-              <a:t>VoigtFit</a:t>
-            </a:r>
-            <a:r>
-              <a:rPr lang="en-US" sz="2800" dirty="0">
-                <a:solidFill>
-                  <a:schemeClr val="bg1"/>
-                </a:solidFill>
-                <a:latin typeface="Arial" panose="020B0604020202020204" pitchFamily="34" charset="0"/>
-                <a:cs typeface="Arial" panose="020B0604020202020204" pitchFamily="34" charset="0"/>
-              </a:rPr>
-              <a:t> component fits to each Stream sightline. The figures are as described above.</a:t>
+              <a:t>: The VoigtFit component fits to each Stream sightline. The figures are as described above.</a:t>
             </a:r>
           </a:p>
           <a:p>
@@ -9138,10 +9439,10 @@
         </p:nvGrpSpPr>
         <p:grpSpPr>
           <a:xfrm>
-            <a:off x="14198641" y="6452299"/>
-            <a:ext cx="11548872" cy="8557114"/>
-            <a:chOff x="14198641" y="6337999"/>
-            <a:chExt cx="11548872" cy="8557114"/>
+            <a:off x="14198641" y="7458075"/>
+            <a:ext cx="11548872" cy="7906938"/>
+            <a:chOff x="14198641" y="6988175"/>
+            <a:chExt cx="11548872" cy="7906938"/>
           </a:xfrm>
         </p:grpSpPr>
         <p:pic>
@@ -9159,14 +9460,14 @@
             <p:nvPr/>
           </p:nvPicPr>
           <p:blipFill rotWithShape="1">
-            <a:blip r:embed="rId9"/>
-            <a:srcRect l="5831" r="7308" b="3460"/>
+            <a:blip r:embed="rId11"/>
+            <a:srcRect l="5831" t="7335" r="7308" b="3460"/>
             <a:stretch/>
           </p:blipFill>
           <p:spPr>
             <a:xfrm>
-              <a:off x="14198641" y="6337999"/>
-              <a:ext cx="11548872" cy="8557114"/>
+              <a:off x="14198641" y="6988175"/>
+              <a:ext cx="11548872" cy="7906938"/>
             </a:xfrm>
             <a:prstGeom prst="rect">
               <a:avLst/>
@@ -9434,10 +9735,10 @@
         </p:nvGrpSpPr>
         <p:grpSpPr>
           <a:xfrm>
-            <a:off x="14271113" y="20044277"/>
-            <a:ext cx="11548436" cy="8585268"/>
-            <a:chOff x="14342581" y="23558243"/>
-            <a:chExt cx="11548436" cy="8585268"/>
+            <a:off x="14271113" y="20745449"/>
+            <a:ext cx="11548436" cy="7985695"/>
+            <a:chOff x="14342581" y="24157815"/>
+            <a:chExt cx="11548436" cy="7985695"/>
           </a:xfrm>
         </p:grpSpPr>
         <p:pic>
@@ -9455,14 +9756,14 @@
             <p:nvPr/>
           </p:nvPicPr>
           <p:blipFill rotWithShape="1">
-            <a:blip r:embed="rId10"/>
-            <a:srcRect l="6214" r="7329" b="3592"/>
+            <a:blip r:embed="rId12"/>
+            <a:srcRect l="6214" t="6733" r="7329" b="3592"/>
             <a:stretch/>
           </p:blipFill>
           <p:spPr>
             <a:xfrm>
-              <a:off x="14342581" y="23558243"/>
-              <a:ext cx="11548436" cy="8585268"/>
+              <a:off x="14342581" y="24157815"/>
+              <a:ext cx="11548436" cy="7985695"/>
             </a:xfrm>
             <a:prstGeom prst="rect">
               <a:avLst/>
@@ -9606,7 +9907,7 @@
           </p:nvSpPr>
           <p:spPr>
             <a:xfrm>
-              <a:off x="21252558" y="31004103"/>
+              <a:off x="21281133" y="31032678"/>
               <a:ext cx="450957" cy="400110"/>
             </a:xfrm>
             <a:prstGeom prst="rect">
@@ -9715,701 +10016,6 @@
             </a:p>
           </p:txBody>
         </p:sp>
-      </p:grpSp>
-      <p:grpSp>
-        <p:nvGrpSpPr>
-          <p:cNvPr id="103" name="Group 102">
-            <a:extLst>
-              <a:ext uri="{FF2B5EF4-FFF2-40B4-BE49-F238E27FC236}">
-                <a16:creationId xmlns:a16="http://schemas.microsoft.com/office/drawing/2014/main" id="{A8730E09-6A1B-9F44-848B-4E1A598711A0}"/>
-              </a:ext>
-            </a:extLst>
-          </p:cNvPr>
-          <p:cNvGrpSpPr/>
-          <p:nvPr/>
-        </p:nvGrpSpPr>
-        <p:grpSpPr>
-          <a:xfrm>
-            <a:off x="1063060" y="25639891"/>
-            <a:ext cx="10324629" cy="4572000"/>
-            <a:chOff x="14885366" y="16370518"/>
-            <a:chExt cx="10324629" cy="4572000"/>
-          </a:xfrm>
-        </p:grpSpPr>
-        <p:grpSp>
-          <p:nvGrpSpPr>
-            <p:cNvPr id="91" name="Group 90">
-              <a:extLst>
-                <a:ext uri="{FF2B5EF4-FFF2-40B4-BE49-F238E27FC236}">
-                  <a16:creationId xmlns:a16="http://schemas.microsoft.com/office/drawing/2014/main" id="{87FF0E63-103A-D947-AA16-DE61E51F919C}"/>
-                </a:ext>
-              </a:extLst>
-            </p:cNvPr>
-            <p:cNvGrpSpPr/>
-            <p:nvPr/>
-          </p:nvGrpSpPr>
-          <p:grpSpPr>
-            <a:xfrm>
-              <a:off x="14885366" y="16370518"/>
-              <a:ext cx="9144000" cy="4572000"/>
-              <a:chOff x="12520310" y="15935054"/>
-              <a:chExt cx="8581420" cy="4399840"/>
-            </a:xfrm>
-          </p:grpSpPr>
-          <p:grpSp>
-            <p:nvGrpSpPr>
-              <p:cNvPr id="90" name="Group 89">
-                <a:extLst>
-                  <a:ext uri="{FF2B5EF4-FFF2-40B4-BE49-F238E27FC236}">
-                    <a16:creationId xmlns:a16="http://schemas.microsoft.com/office/drawing/2014/main" id="{62265D8A-C365-C54F-8894-21A0FB008BEA}"/>
-                  </a:ext>
-                </a:extLst>
-              </p:cNvPr>
-              <p:cNvGrpSpPr/>
-              <p:nvPr/>
-            </p:nvGrpSpPr>
-            <p:grpSpPr>
-              <a:xfrm>
-                <a:off x="12520310" y="15935054"/>
-                <a:ext cx="8581420" cy="4399840"/>
-                <a:chOff x="12520310" y="15935054"/>
-                <a:chExt cx="8581420" cy="4399840"/>
-              </a:xfrm>
-            </p:grpSpPr>
-            <p:pic>
-              <p:nvPicPr>
-                <p:cNvPr id="3" name="Picture 2">
-                  <a:extLst>
-                    <a:ext uri="{FF2B5EF4-FFF2-40B4-BE49-F238E27FC236}">
-                      <a16:creationId xmlns:a16="http://schemas.microsoft.com/office/drawing/2014/main" id="{E8E06ED7-F592-5744-94E2-AD4E4922DBC9}"/>
-                    </a:ext>
-                  </a:extLst>
-                </p:cNvPr>
-                <p:cNvPicPr>
-                  <a:picLocks noChangeAspect="1"/>
-                </p:cNvPicPr>
-                <p:nvPr/>
-              </p:nvPicPr>
-              <p:blipFill rotWithShape="1">
-                <a:blip r:embed="rId11"/>
-                <a:srcRect t="8670" r="6153" b="27174"/>
-                <a:stretch/>
-              </p:blipFill>
-              <p:spPr>
-                <a:xfrm>
-                  <a:off x="12520310" y="15935054"/>
-                  <a:ext cx="8581420" cy="4399840"/>
-                </a:xfrm>
-                <a:prstGeom prst="rect">
-                  <a:avLst/>
-                </a:prstGeom>
-              </p:spPr>
-            </p:pic>
-            <p:sp>
-              <p:nvSpPr>
-                <p:cNvPr id="4" name="TextBox 3">
-                  <a:extLst>
-                    <a:ext uri="{FF2B5EF4-FFF2-40B4-BE49-F238E27FC236}">
-                      <a16:creationId xmlns:a16="http://schemas.microsoft.com/office/drawing/2014/main" id="{5CF3A238-889D-DA48-B24D-ADB690194D78}"/>
-                    </a:ext>
-                  </a:extLst>
-                </p:cNvPr>
-                <p:cNvSpPr txBox="1"/>
-                <p:nvPr/>
-              </p:nvSpPr>
-              <p:spPr>
-                <a:xfrm>
-                  <a:off x="16085615" y="19093881"/>
-                  <a:ext cx="307195" cy="385044"/>
-                </a:xfrm>
-                <a:prstGeom prst="rect">
-                  <a:avLst/>
-                </a:prstGeom>
-                <a:noFill/>
-              </p:spPr>
-              <p:txBody>
-                <a:bodyPr wrap="none" rtlCol="0">
-                  <a:spAutoFit/>
-                </a:bodyPr>
-                <a:lstStyle/>
-                <a:p>
-                  <a:r>
-                    <a:rPr lang="en-US" sz="2000" dirty="0">
-                      <a:solidFill>
-                        <a:schemeClr val="bg1"/>
-                      </a:solidFill>
-                      <a:latin typeface="Arial" panose="020B0604020202020204" pitchFamily="34" charset="0"/>
-                      <a:cs typeface="Arial" panose="020B0604020202020204" pitchFamily="34" charset="0"/>
-                    </a:rPr>
-                    <a:t>8</a:t>
-                  </a:r>
-                </a:p>
-              </p:txBody>
-            </p:sp>
-            <p:sp>
-              <p:nvSpPr>
-                <p:cNvPr id="31" name="TextBox 30">
-                  <a:extLst>
-                    <a:ext uri="{FF2B5EF4-FFF2-40B4-BE49-F238E27FC236}">
-                      <a16:creationId xmlns:a16="http://schemas.microsoft.com/office/drawing/2014/main" id="{4B21B1D1-6105-DC4A-8FA5-DE7E79D99F40}"/>
-                    </a:ext>
-                  </a:extLst>
-                </p:cNvPr>
-                <p:cNvSpPr txBox="1"/>
-                <p:nvPr/>
-              </p:nvSpPr>
-              <p:spPr>
-                <a:xfrm>
-                  <a:off x="19253909" y="17052581"/>
-                  <a:ext cx="307195" cy="385044"/>
-                </a:xfrm>
-                <a:prstGeom prst="rect">
-                  <a:avLst/>
-                </a:prstGeom>
-                <a:noFill/>
-              </p:spPr>
-              <p:txBody>
-                <a:bodyPr wrap="none" rtlCol="0">
-                  <a:spAutoFit/>
-                </a:bodyPr>
-                <a:lstStyle/>
-                <a:p>
-                  <a:r>
-                    <a:rPr lang="en-US" sz="2000" dirty="0">
-                      <a:solidFill>
-                        <a:schemeClr val="bg1"/>
-                      </a:solidFill>
-                      <a:latin typeface="Arial" panose="020B0604020202020204" pitchFamily="34" charset="0"/>
-                      <a:cs typeface="Arial" panose="020B0604020202020204" pitchFamily="34" charset="0"/>
-                    </a:rPr>
-                    <a:t>3</a:t>
-                  </a:r>
-                </a:p>
-              </p:txBody>
-            </p:sp>
-            <p:sp>
-              <p:nvSpPr>
-                <p:cNvPr id="63" name="TextBox 62">
-                  <a:extLst>
-                    <a:ext uri="{FF2B5EF4-FFF2-40B4-BE49-F238E27FC236}">
-                      <a16:creationId xmlns:a16="http://schemas.microsoft.com/office/drawing/2014/main" id="{E478750B-3079-AB4C-81A4-41681656820B}"/>
-                    </a:ext>
-                  </a:extLst>
-                </p:cNvPr>
-                <p:cNvSpPr txBox="1"/>
-                <p:nvPr/>
-              </p:nvSpPr>
-              <p:spPr>
-                <a:xfrm>
-                  <a:off x="18317082" y="18398384"/>
-                  <a:ext cx="307195" cy="385044"/>
-                </a:xfrm>
-                <a:prstGeom prst="rect">
-                  <a:avLst/>
-                </a:prstGeom>
-                <a:noFill/>
-              </p:spPr>
-              <p:txBody>
-                <a:bodyPr wrap="none" rtlCol="0">
-                  <a:spAutoFit/>
-                </a:bodyPr>
-                <a:lstStyle/>
-                <a:p>
-                  <a:r>
-                    <a:rPr lang="en-US" sz="2000" dirty="0">
-                      <a:solidFill>
-                        <a:schemeClr val="bg1"/>
-                      </a:solidFill>
-                      <a:latin typeface="Arial" panose="020B0604020202020204" pitchFamily="34" charset="0"/>
-                      <a:cs typeface="Arial" panose="020B0604020202020204" pitchFamily="34" charset="0"/>
-                    </a:rPr>
-                    <a:t>6</a:t>
-                  </a:r>
-                </a:p>
-              </p:txBody>
-            </p:sp>
-            <p:sp>
-              <p:nvSpPr>
-                <p:cNvPr id="64" name="TextBox 63">
-                  <a:extLst>
-                    <a:ext uri="{FF2B5EF4-FFF2-40B4-BE49-F238E27FC236}">
-                      <a16:creationId xmlns:a16="http://schemas.microsoft.com/office/drawing/2014/main" id="{84DBB45A-6C8A-A040-916F-D9015D47B861}"/>
-                    </a:ext>
-                  </a:extLst>
-                </p:cNvPr>
-                <p:cNvSpPr txBox="1"/>
-                <p:nvPr/>
-              </p:nvSpPr>
-              <p:spPr>
-                <a:xfrm>
-                  <a:off x="16386733" y="19131973"/>
-                  <a:ext cx="423212" cy="385044"/>
-                </a:xfrm>
-                <a:prstGeom prst="rect">
-                  <a:avLst/>
-                </a:prstGeom>
-                <a:noFill/>
-              </p:spPr>
-              <p:txBody>
-                <a:bodyPr wrap="none" rtlCol="0">
-                  <a:spAutoFit/>
-                </a:bodyPr>
-                <a:lstStyle/>
-                <a:p>
-                  <a:r>
-                    <a:rPr lang="en-US" sz="2000" dirty="0">
-                      <a:solidFill>
-                        <a:schemeClr val="bg1"/>
-                      </a:solidFill>
-                      <a:latin typeface="Arial" panose="020B0604020202020204" pitchFamily="34" charset="0"/>
-                      <a:cs typeface="Arial" panose="020B0604020202020204" pitchFamily="34" charset="0"/>
-                    </a:rPr>
-                    <a:t>11</a:t>
-                  </a:r>
-                </a:p>
-              </p:txBody>
-            </p:sp>
-            <p:sp>
-              <p:nvSpPr>
-                <p:cNvPr id="65" name="TextBox 64">
-                  <a:extLst>
-                    <a:ext uri="{FF2B5EF4-FFF2-40B4-BE49-F238E27FC236}">
-                      <a16:creationId xmlns:a16="http://schemas.microsoft.com/office/drawing/2014/main" id="{6DED153E-5C78-A34D-B366-F8324B9ED7A6}"/>
-                    </a:ext>
-                  </a:extLst>
-                </p:cNvPr>
-                <p:cNvSpPr txBox="1"/>
-                <p:nvPr/>
-              </p:nvSpPr>
-              <p:spPr>
-                <a:xfrm>
-                  <a:off x="18712748" y="16963101"/>
-                  <a:ext cx="307195" cy="385044"/>
-                </a:xfrm>
-                <a:prstGeom prst="rect">
-                  <a:avLst/>
-                </a:prstGeom>
-                <a:noFill/>
-              </p:spPr>
-              <p:txBody>
-                <a:bodyPr wrap="none" rtlCol="0">
-                  <a:spAutoFit/>
-                </a:bodyPr>
-                <a:lstStyle/>
-                <a:p>
-                  <a:r>
-                    <a:rPr lang="en-US" sz="2000" dirty="0">
-                      <a:solidFill>
-                        <a:schemeClr val="bg1"/>
-                      </a:solidFill>
-                      <a:latin typeface="Arial" panose="020B0604020202020204" pitchFamily="34" charset="0"/>
-                      <a:cs typeface="Arial" panose="020B0604020202020204" pitchFamily="34" charset="0"/>
-                    </a:rPr>
-                    <a:t>1</a:t>
-                  </a:r>
-                </a:p>
-              </p:txBody>
-            </p:sp>
-            <p:sp>
-              <p:nvSpPr>
-                <p:cNvPr id="66" name="TextBox 65">
-                  <a:extLst>
-                    <a:ext uri="{FF2B5EF4-FFF2-40B4-BE49-F238E27FC236}">
-                      <a16:creationId xmlns:a16="http://schemas.microsoft.com/office/drawing/2014/main" id="{E8BDCB1B-C0F7-3646-A755-CD616C0D9795}"/>
-                    </a:ext>
-                  </a:extLst>
-                </p:cNvPr>
-                <p:cNvSpPr txBox="1"/>
-                <p:nvPr/>
-              </p:nvSpPr>
-              <p:spPr>
-                <a:xfrm>
-                  <a:off x="15464652" y="19093881"/>
-                  <a:ext cx="466671" cy="400110"/>
-                </a:xfrm>
-                <a:prstGeom prst="rect">
-                  <a:avLst/>
-                </a:prstGeom>
-                <a:noFill/>
-              </p:spPr>
-              <p:txBody>
-                <a:bodyPr wrap="square" rtlCol="0">
-                  <a:spAutoFit/>
-                </a:bodyPr>
-                <a:lstStyle/>
-                <a:p>
-                  <a:r>
-                    <a:rPr lang="en-US" sz="2000" dirty="0">
-                      <a:solidFill>
-                        <a:schemeClr val="bg1"/>
-                      </a:solidFill>
-                      <a:latin typeface="Arial" panose="020B0604020202020204" pitchFamily="34" charset="0"/>
-                      <a:cs typeface="Arial" panose="020B0604020202020204" pitchFamily="34" charset="0"/>
-                    </a:rPr>
-                    <a:t>12</a:t>
-                  </a:r>
-                </a:p>
-              </p:txBody>
-            </p:sp>
-            <p:sp>
-              <p:nvSpPr>
-                <p:cNvPr id="67" name="TextBox 66">
-                  <a:extLst>
-                    <a:ext uri="{FF2B5EF4-FFF2-40B4-BE49-F238E27FC236}">
-                      <a16:creationId xmlns:a16="http://schemas.microsoft.com/office/drawing/2014/main" id="{A9AE0EEF-FA1C-4E41-9D01-8450D9413093}"/>
-                    </a:ext>
-                  </a:extLst>
-                </p:cNvPr>
-                <p:cNvSpPr txBox="1"/>
-                <p:nvPr/>
-              </p:nvSpPr>
-              <p:spPr>
-                <a:xfrm>
-                  <a:off x="18948896" y="16700194"/>
-                  <a:ext cx="307195" cy="385044"/>
-                </a:xfrm>
-                <a:prstGeom prst="rect">
-                  <a:avLst/>
-                </a:prstGeom>
-                <a:noFill/>
-              </p:spPr>
-              <p:txBody>
-                <a:bodyPr wrap="none" rtlCol="0">
-                  <a:spAutoFit/>
-                </a:bodyPr>
-                <a:lstStyle/>
-                <a:p>
-                  <a:r>
-                    <a:rPr lang="en-US" sz="2000" dirty="0">
-                      <a:solidFill>
-                        <a:schemeClr val="bg1"/>
-                      </a:solidFill>
-                      <a:latin typeface="Arial" panose="020B0604020202020204" pitchFamily="34" charset="0"/>
-                      <a:cs typeface="Arial" panose="020B0604020202020204" pitchFamily="34" charset="0"/>
-                    </a:rPr>
-                    <a:t>4</a:t>
-                  </a:r>
-                </a:p>
-              </p:txBody>
-            </p:sp>
-            <p:sp>
-              <p:nvSpPr>
-                <p:cNvPr id="68" name="TextBox 67">
-                  <a:extLst>
-                    <a:ext uri="{FF2B5EF4-FFF2-40B4-BE49-F238E27FC236}">
-                      <a16:creationId xmlns:a16="http://schemas.microsoft.com/office/drawing/2014/main" id="{B271755F-BB4D-224B-869B-5516F174B883}"/>
-                    </a:ext>
-                  </a:extLst>
-                </p:cNvPr>
-                <p:cNvSpPr txBox="1"/>
-                <p:nvPr/>
-              </p:nvSpPr>
-              <p:spPr>
-                <a:xfrm>
-                  <a:off x="19047702" y="17413416"/>
-                  <a:ext cx="307195" cy="385044"/>
-                </a:xfrm>
-                <a:prstGeom prst="rect">
-                  <a:avLst/>
-                </a:prstGeom>
-                <a:noFill/>
-              </p:spPr>
-              <p:txBody>
-                <a:bodyPr wrap="none" rtlCol="0">
-                  <a:spAutoFit/>
-                </a:bodyPr>
-                <a:lstStyle/>
-                <a:p>
-                  <a:r>
-                    <a:rPr lang="en-US" sz="2000" dirty="0">
-                      <a:solidFill>
-                        <a:schemeClr val="bg1"/>
-                      </a:solidFill>
-                      <a:latin typeface="Arial" panose="020B0604020202020204" pitchFamily="34" charset="0"/>
-                      <a:cs typeface="Arial" panose="020B0604020202020204" pitchFamily="34" charset="0"/>
-                    </a:rPr>
-                    <a:t>5</a:t>
-                  </a:r>
-                </a:p>
-              </p:txBody>
-            </p:sp>
-            <p:sp>
-              <p:nvSpPr>
-                <p:cNvPr id="69" name="TextBox 68">
-                  <a:extLst>
-                    <a:ext uri="{FF2B5EF4-FFF2-40B4-BE49-F238E27FC236}">
-                      <a16:creationId xmlns:a16="http://schemas.microsoft.com/office/drawing/2014/main" id="{EAE4D06C-59FE-B64D-A240-6E44DD2A059B}"/>
-                    </a:ext>
-                  </a:extLst>
-                </p:cNvPr>
-                <p:cNvSpPr txBox="1"/>
-                <p:nvPr/>
-              </p:nvSpPr>
-              <p:spPr>
-                <a:xfrm>
-                  <a:off x="16456240" y="19513566"/>
-                  <a:ext cx="441083" cy="385044"/>
-                </a:xfrm>
-                <a:prstGeom prst="rect">
-                  <a:avLst/>
-                </a:prstGeom>
-                <a:noFill/>
-              </p:spPr>
-              <p:txBody>
-                <a:bodyPr wrap="none" rtlCol="0">
-                  <a:spAutoFit/>
-                </a:bodyPr>
-                <a:lstStyle/>
-                <a:p>
-                  <a:r>
-                    <a:rPr lang="en-US" sz="2000" dirty="0">
-                      <a:solidFill>
-                        <a:schemeClr val="bg1"/>
-                      </a:solidFill>
-                      <a:latin typeface="Arial" panose="020B0604020202020204" pitchFamily="34" charset="0"/>
-                      <a:cs typeface="Arial" panose="020B0604020202020204" pitchFamily="34" charset="0"/>
-                    </a:rPr>
-                    <a:t>10</a:t>
-                  </a:r>
-                </a:p>
-              </p:txBody>
-            </p:sp>
-            <p:sp>
-              <p:nvSpPr>
-                <p:cNvPr id="70" name="TextBox 69">
-                  <a:extLst>
-                    <a:ext uri="{FF2B5EF4-FFF2-40B4-BE49-F238E27FC236}">
-                      <a16:creationId xmlns:a16="http://schemas.microsoft.com/office/drawing/2014/main" id="{7742E49E-3D34-3B47-993A-C925C908B87C}"/>
-                    </a:ext>
-                  </a:extLst>
-                </p:cNvPr>
-                <p:cNvSpPr txBox="1"/>
-                <p:nvPr/>
-              </p:nvSpPr>
-              <p:spPr>
-                <a:xfrm>
-                  <a:off x="18354585" y="17297105"/>
-                  <a:ext cx="307195" cy="385044"/>
-                </a:xfrm>
-                <a:prstGeom prst="rect">
-                  <a:avLst/>
-                </a:prstGeom>
-                <a:noFill/>
-              </p:spPr>
-              <p:txBody>
-                <a:bodyPr wrap="none" rtlCol="0">
-                  <a:spAutoFit/>
-                </a:bodyPr>
-                <a:lstStyle/>
-                <a:p>
-                  <a:r>
-                    <a:rPr lang="en-US" sz="2000" dirty="0">
-                      <a:solidFill>
-                        <a:schemeClr val="bg1"/>
-                      </a:solidFill>
-                      <a:latin typeface="Arial" panose="020B0604020202020204" pitchFamily="34" charset="0"/>
-                      <a:cs typeface="Arial" panose="020B0604020202020204" pitchFamily="34" charset="0"/>
-                    </a:rPr>
-                    <a:t>2</a:t>
-                  </a:r>
-                </a:p>
-              </p:txBody>
-            </p:sp>
-            <p:cxnSp>
-              <p:nvCxnSpPr>
-                <p:cNvPr id="71" name="Straight Arrow Connector 70">
-                  <a:extLst>
-                    <a:ext uri="{FF2B5EF4-FFF2-40B4-BE49-F238E27FC236}">
-                      <a16:creationId xmlns:a16="http://schemas.microsoft.com/office/drawing/2014/main" id="{5CCBEAED-6CB6-2E42-9F3E-A865E48B4260}"/>
-                    </a:ext>
-                  </a:extLst>
-                </p:cNvPr>
-                <p:cNvCxnSpPr>
-                  <a:cxnSpLocks/>
-                </p:cNvCxnSpPr>
-                <p:nvPr/>
-              </p:nvCxnSpPr>
-              <p:spPr>
-                <a:xfrm>
-                  <a:off x="18889399" y="17302190"/>
-                  <a:ext cx="0" cy="163749"/>
-                </a:xfrm>
-                <a:prstGeom prst="straightConnector1">
-                  <a:avLst/>
-                </a:prstGeom>
-                <a:ln>
-                  <a:tailEnd type="triangle"/>
-                </a:ln>
-              </p:spPr>
-              <p:style>
-                <a:lnRef idx="1">
-                  <a:schemeClr val="dk1"/>
-                </a:lnRef>
-                <a:fillRef idx="0">
-                  <a:schemeClr val="dk1"/>
-                </a:fillRef>
-                <a:effectRef idx="0">
-                  <a:schemeClr val="dk1"/>
-                </a:effectRef>
-                <a:fontRef idx="minor">
-                  <a:schemeClr val="tx1"/>
-                </a:fontRef>
-              </p:style>
-            </p:cxnSp>
-            <p:sp>
-              <p:nvSpPr>
-                <p:cNvPr id="73" name="TextBox 72">
-                  <a:extLst>
-                    <a:ext uri="{FF2B5EF4-FFF2-40B4-BE49-F238E27FC236}">
-                      <a16:creationId xmlns:a16="http://schemas.microsoft.com/office/drawing/2014/main" id="{0EBC902F-20E1-A743-BD22-F8F42362955B}"/>
-                    </a:ext>
-                  </a:extLst>
-                </p:cNvPr>
-                <p:cNvSpPr txBox="1"/>
-                <p:nvPr/>
-              </p:nvSpPr>
-              <p:spPr>
-                <a:xfrm>
-                  <a:off x="18118470" y="19059266"/>
-                  <a:ext cx="307195" cy="385044"/>
-                </a:xfrm>
-                <a:prstGeom prst="rect">
-                  <a:avLst/>
-                </a:prstGeom>
-                <a:noFill/>
-              </p:spPr>
-              <p:txBody>
-                <a:bodyPr wrap="none" rtlCol="0">
-                  <a:spAutoFit/>
-                </a:bodyPr>
-                <a:lstStyle/>
-                <a:p>
-                  <a:r>
-                    <a:rPr lang="en-US" sz="2000" dirty="0">
-                      <a:solidFill>
-                        <a:schemeClr val="bg1"/>
-                      </a:solidFill>
-                      <a:latin typeface="Arial" panose="020B0604020202020204" pitchFamily="34" charset="0"/>
-                      <a:cs typeface="Arial" panose="020B0604020202020204" pitchFamily="34" charset="0"/>
-                    </a:rPr>
-                    <a:t>9</a:t>
-                  </a:r>
-                </a:p>
-              </p:txBody>
-            </p:sp>
-            <p:sp>
-              <p:nvSpPr>
-                <p:cNvPr id="81" name="TextBox 80">
-                  <a:extLst>
-                    <a:ext uri="{FF2B5EF4-FFF2-40B4-BE49-F238E27FC236}">
-                      <a16:creationId xmlns:a16="http://schemas.microsoft.com/office/drawing/2014/main" id="{B2125EE0-3617-4E48-9354-CA719591449E}"/>
-                    </a:ext>
-                  </a:extLst>
-                </p:cNvPr>
-                <p:cNvSpPr txBox="1"/>
-                <p:nvPr/>
-              </p:nvSpPr>
-              <p:spPr>
-                <a:xfrm>
-                  <a:off x="17517551" y="19362797"/>
-                  <a:ext cx="390300" cy="400110"/>
-                </a:xfrm>
-                <a:prstGeom prst="rect">
-                  <a:avLst/>
-                </a:prstGeom>
-                <a:noFill/>
-              </p:spPr>
-              <p:txBody>
-                <a:bodyPr wrap="square" rtlCol="0">
-                  <a:spAutoFit/>
-                </a:bodyPr>
-                <a:lstStyle/>
-                <a:p>
-                  <a:r>
-                    <a:rPr lang="en-US" sz="2000" dirty="0">
-                      <a:solidFill>
-                        <a:schemeClr val="bg1"/>
-                      </a:solidFill>
-                      <a:latin typeface="Arial" panose="020B0604020202020204" pitchFamily="34" charset="0"/>
-                      <a:cs typeface="Arial" panose="020B0604020202020204" pitchFamily="34" charset="0"/>
-                    </a:rPr>
-                    <a:t>7</a:t>
-                  </a:r>
-                </a:p>
-              </p:txBody>
-            </p:sp>
-          </p:grpSp>
-          <p:cxnSp>
-            <p:nvCxnSpPr>
-              <p:cNvPr id="12" name="Straight Arrow Connector 11">
-                <a:extLst>
-                  <a:ext uri="{FF2B5EF4-FFF2-40B4-BE49-F238E27FC236}">
-                    <a16:creationId xmlns:a16="http://schemas.microsoft.com/office/drawing/2014/main" id="{6DED7F98-1204-954E-B084-A1C724AA4C5E}"/>
-                  </a:ext>
-                </a:extLst>
-              </p:cNvPr>
-              <p:cNvCxnSpPr>
-                <a:cxnSpLocks/>
-              </p:cNvCxnSpPr>
-              <p:nvPr/>
-            </p:nvCxnSpPr>
-            <p:spPr>
-              <a:xfrm flipH="1">
-                <a:off x="16360316" y="19385977"/>
-                <a:ext cx="142244" cy="135586"/>
-              </a:xfrm>
-              <a:prstGeom prst="straightConnector1">
-                <a:avLst/>
-              </a:prstGeom>
-              <a:ln>
-                <a:tailEnd type="triangle"/>
-              </a:ln>
-            </p:spPr>
-            <p:style>
-              <a:lnRef idx="1">
-                <a:schemeClr val="dk1"/>
-              </a:lnRef>
-              <a:fillRef idx="0">
-                <a:schemeClr val="dk1"/>
-              </a:fillRef>
-              <a:effectRef idx="0">
-                <a:schemeClr val="dk1"/>
-              </a:effectRef>
-              <a:fontRef idx="minor">
-                <a:schemeClr val="tx1"/>
-              </a:fontRef>
-            </p:style>
-          </p:cxnSp>
-        </p:grpSp>
-        <p:pic>
-          <p:nvPicPr>
-            <p:cNvPr id="93" name="Picture 92">
-              <a:extLst>
-                <a:ext uri="{FF2B5EF4-FFF2-40B4-BE49-F238E27FC236}">
-                  <a16:creationId xmlns:a16="http://schemas.microsoft.com/office/drawing/2014/main" id="{DD28FCB0-2C77-584B-8BEF-1CFDE254DF8C}"/>
-                </a:ext>
-              </a:extLst>
-            </p:cNvPr>
-            <p:cNvPicPr>
-              <a:picLocks noChangeAspect="1"/>
-            </p:cNvPicPr>
-            <p:nvPr/>
-          </p:nvPicPr>
-          <p:blipFill rotWithShape="1">
-            <a:blip r:embed="rId12"/>
-            <a:srcRect l="76855" t="10237" r="6112" b="8604"/>
-            <a:stretch/>
-          </p:blipFill>
-          <p:spPr>
-            <a:xfrm>
-              <a:off x="23964008" y="16430153"/>
-              <a:ext cx="1245987" cy="4452730"/>
-            </a:xfrm>
-            <a:prstGeom prst="rect">
-              <a:avLst/>
-            </a:prstGeom>
-          </p:spPr>
-        </p:pic>
       </p:grpSp>
       <p:grpSp>
         <p:nvGrpSpPr>
@@ -10861,24 +10467,14 @@
               <a:t>the </a:t>
             </a:r>
             <a:r>
-              <a:rPr lang="en-US" sz="2800" b="1" dirty="0" err="1">
+              <a:rPr lang="en-US" sz="2800" b="1" dirty="0">
                 <a:solidFill>
                   <a:schemeClr val="bg1"/>
                 </a:solidFill>
                 <a:latin typeface="Arial" panose="020B0604020202020204" pitchFamily="34" charset="0"/>
                 <a:cs typeface="Arial" panose="020B0604020202020204" pitchFamily="34" charset="0"/>
               </a:rPr>
-              <a:t>Seyfert</a:t>
-            </a:r>
-            <a:r>
-              <a:rPr lang="en-US" sz="2800" b="1" dirty="0">
-                <a:solidFill>
-                  <a:schemeClr val="bg1"/>
-                </a:solidFill>
-                <a:latin typeface="Arial" panose="020B0604020202020204" pitchFamily="34" charset="0"/>
-                <a:cs typeface="Arial" panose="020B0604020202020204" pitchFamily="34" charset="0"/>
-              </a:rPr>
-              <a:t> flare model </a:t>
+              <a:t>Seyfert flare model </a:t>
             </a:r>
             <a:r>
               <a:rPr lang="en-US" sz="2800" dirty="0">
@@ -11984,7 +11580,7 @@
             <a:lstStyle/>
             <a:p>
               <a:pPr algn="ctr"/>
-              <a:endParaRPr lang="en-US"/>
+              <a:endParaRPr lang="en-US" dirty="0"/>
             </a:p>
           </p:txBody>
         </p:sp>
@@ -12120,7 +11716,7 @@
             <a:lstStyle/>
             <a:p>
               <a:pPr algn="ctr"/>
-              <a:endParaRPr lang="en-US"/>
+              <a:endParaRPr lang="en-US" dirty="0"/>
             </a:p>
           </p:txBody>
         </p:sp>
@@ -12331,7 +11927,7 @@
             <a:lstStyle/>
             <a:p>
               <a:pPr algn="ctr"/>
-              <a:endParaRPr lang="en-US"/>
+              <a:endParaRPr lang="en-US" dirty="0"/>
             </a:p>
           </p:txBody>
         </p:sp>
@@ -12484,7 +12080,7 @@
             <a:lstStyle/>
             <a:p>
               <a:pPr algn="ctr"/>
-              <a:endParaRPr lang="en-US"/>
+              <a:endParaRPr lang="en-US" dirty="0"/>
             </a:p>
           </p:txBody>
         </p:sp>
@@ -12619,7 +12215,7 @@
           <a:lstStyle/>
           <a:p>
             <a:pPr algn="ctr"/>
-            <a:endParaRPr lang="en-US"/>
+            <a:endParaRPr lang="en-US" dirty="0"/>
           </a:p>
         </p:txBody>
       </p:sp>
@@ -12671,7 +12267,7 @@
           <a:lstStyle/>
           <a:p>
             <a:pPr algn="ctr"/>
-            <a:endParaRPr lang="en-US"/>
+            <a:endParaRPr lang="en-US" dirty="0"/>
           </a:p>
         </p:txBody>
       </p:sp>
@@ -12715,6 +12311,88 @@
           </a:fontRef>
         </p:style>
       </p:cxnSp>
+      <p:sp>
+        <p:nvSpPr>
+          <p:cNvPr id="10" name="TextBox 9">
+            <a:extLst>
+              <a:ext uri="{FF2B5EF4-FFF2-40B4-BE49-F238E27FC236}">
+                <a16:creationId xmlns:a16="http://schemas.microsoft.com/office/drawing/2014/main" id="{3E5283FD-8A97-B44C-80B6-C2A48CB5F2D0}"/>
+              </a:ext>
+            </a:extLst>
+          </p:cNvPr>
+          <p:cNvSpPr txBox="1"/>
+          <p:nvPr/>
+        </p:nvSpPr>
+        <p:spPr>
+          <a:xfrm>
+            <a:off x="18060980" y="6939834"/>
+            <a:ext cx="4111638" cy="553998"/>
+          </a:xfrm>
+          <a:prstGeom prst="rect">
+            <a:avLst/>
+          </a:prstGeom>
+          <a:noFill/>
+        </p:spPr>
+        <p:txBody>
+          <a:bodyPr wrap="none" rtlCol="0">
+            <a:spAutoFit/>
+          </a:bodyPr>
+          <a:lstStyle/>
+          <a:p>
+            <a:r>
+              <a:rPr lang="en-US" sz="3000" dirty="0">
+                <a:solidFill>
+                  <a:schemeClr val="bg1"/>
+                </a:solidFill>
+                <a:latin typeface="Arial" panose="020B0604020202020204" pitchFamily="34" charset="0"/>
+                <a:cs typeface="Arial" panose="020B0604020202020204" pitchFamily="34" charset="0"/>
+              </a:rPr>
+              <a:t>Leading Arm Sightlines</a:t>
+            </a:r>
+          </a:p>
+        </p:txBody>
+      </p:sp>
+      <p:sp>
+        <p:nvSpPr>
+          <p:cNvPr id="115" name="TextBox 114">
+            <a:extLst>
+              <a:ext uri="{FF2B5EF4-FFF2-40B4-BE49-F238E27FC236}">
+                <a16:creationId xmlns:a16="http://schemas.microsoft.com/office/drawing/2014/main" id="{C4180986-E2F0-B24B-93CF-5CEF68D2CA3A}"/>
+              </a:ext>
+            </a:extLst>
+          </p:cNvPr>
+          <p:cNvSpPr txBox="1"/>
+          <p:nvPr/>
+        </p:nvSpPr>
+        <p:spPr>
+          <a:xfrm>
+            <a:off x="17613372" y="20275949"/>
+            <a:ext cx="5136342" cy="553998"/>
+          </a:xfrm>
+          <a:prstGeom prst="rect">
+            <a:avLst/>
+          </a:prstGeom>
+          <a:noFill/>
+        </p:spPr>
+        <p:txBody>
+          <a:bodyPr wrap="none" rtlCol="0">
+            <a:spAutoFit/>
+          </a:bodyPr>
+          <a:lstStyle/>
+          <a:p>
+            <a:r>
+              <a:rPr lang="en-US" sz="3000" dirty="0">
+                <a:solidFill>
+                  <a:schemeClr val="bg1"/>
+                </a:solidFill>
+                <a:latin typeface="Arial" panose="020B0604020202020204" pitchFamily="34" charset="0"/>
+                <a:cs typeface="Arial" panose="020B0604020202020204" pitchFamily="34" charset="0"/>
+              </a:rPr>
+              <a:t>Magellanic Stream Sightlines</a:t>
+            </a:r>
+          </a:p>
+        </p:txBody>
+      </p:sp>
     </p:spTree>
     <p:extLst>
       <p:ext uri="{BB962C8B-B14F-4D97-AF65-F5344CB8AC3E}">

</xml_diff>